<commit_message>
complete image credits Day 1
</commit_message>
<xml_diff>
--- a/Day2/HMM_Tutorial_Day2.pptx
+++ b/Day2/HMM_Tutorial_Day2.pptx
@@ -7,15 +7,16 @@
   <p:sldIdLst>
     <p:sldId id="257" r:id="rId2"/>
     <p:sldId id="263" r:id="rId3"/>
-    <p:sldId id="262" r:id="rId4"/>
-    <p:sldId id="275" r:id="rId5"/>
-    <p:sldId id="270" r:id="rId6"/>
-    <p:sldId id="271" r:id="rId7"/>
-    <p:sldId id="272" r:id="rId8"/>
-    <p:sldId id="274" r:id="rId9"/>
-    <p:sldId id="273" r:id="rId10"/>
-    <p:sldId id="276" r:id="rId11"/>
-    <p:sldId id="277" r:id="rId12"/>
+    <p:sldId id="278" r:id="rId4"/>
+    <p:sldId id="262" r:id="rId5"/>
+    <p:sldId id="275" r:id="rId6"/>
+    <p:sldId id="270" r:id="rId7"/>
+    <p:sldId id="271" r:id="rId8"/>
+    <p:sldId id="272" r:id="rId9"/>
+    <p:sldId id="274" r:id="rId10"/>
+    <p:sldId id="273" r:id="rId11"/>
+    <p:sldId id="276" r:id="rId12"/>
+    <p:sldId id="277" r:id="rId13"/>
   </p:sldIdLst>
   <p:sldSz cx="12192000" cy="6858000"/>
   <p:notesSz cx="6858000" cy="9144000"/>
@@ -4055,7 +4056,7 @@
           <p:cNvPr id="2" name="Content Placeholder 1">
             <a:extLst>
               <a:ext uri="{FF2B5EF4-FFF2-40B4-BE49-F238E27FC236}">
-                <a16:creationId xmlns:a16="http://schemas.microsoft.com/office/drawing/2014/main" id="{4AE96CCD-2BB8-4A31-8EEF-6888B51122A5}"/>
+                <a16:creationId xmlns:a16="http://schemas.microsoft.com/office/drawing/2014/main" id="{7A530896-B549-4891-9A95-1F6A5687FC0D}"/>
               </a:ext>
             </a:extLst>
           </p:cNvPr>
@@ -4066,21 +4067,24 @@
             <p:ph idx="1"/>
           </p:nvPr>
         </p:nvSpPr>
-        <p:spPr>
-          <a:xfrm>
-            <a:off x="623947" y="1431144"/>
-            <a:ext cx="10944109" cy="5179206"/>
-          </a:xfrm>
-        </p:spPr>
+        <p:spPr/>
         <p:txBody>
-          <a:bodyPr>
-            <a:normAutofit/>
-          </a:bodyPr>
+          <a:bodyPr/>
           <a:lstStyle/>
           <a:p>
             <a:r>
-              <a:rPr lang="en-CA" dirty="0"/>
-              <a:t>Selecting data streams</a:t>
+              <a:rPr lang="en-US" dirty="0"/>
+              <a:t>Calculate dive metrics using </a:t>
+            </a:r>
+            <a:r>
+              <a:rPr lang="en-US" dirty="0" err="1">
+                <a:latin typeface="Lucida Console" panose="020B0609040504020204" pitchFamily="49" charset="0"/>
+              </a:rPr>
+              <a:t>diveMove</a:t>
+            </a:r>
+            <a:r>
+              <a:rPr lang="en-US" dirty="0"/>
+              <a:t> package: </a:t>
             </a:r>
           </a:p>
           <a:p>
@@ -4089,9 +4093,18 @@
               <a:buAutoNum type="arabicPeriod"/>
             </a:pPr>
             <a:r>
-              <a:rPr lang="en-CA" dirty="0"/>
-              <a:t>Minimal missing data</a:t>
-            </a:r>
+              <a:rPr lang="en-US" dirty="0"/>
+              <a:t>Create TDR class using </a:t>
+            </a:r>
+            <a:r>
+              <a:rPr lang="en-US" dirty="0" err="1">
+                <a:latin typeface="Lucida Console" panose="020B0609040504020204" pitchFamily="49" charset="0"/>
+              </a:rPr>
+              <a:t>createTDR</a:t>
+            </a:r>
+            <a:endParaRPr lang="en-US" dirty="0">
+              <a:latin typeface="Lucida Console" panose="020B0609040504020204" pitchFamily="49" charset="0"/>
+            </a:endParaRPr>
           </a:p>
           <a:p>
             <a:pPr marL="907200" lvl="1" indent="-457200">
@@ -4100,8 +4113,17 @@
             </a:pPr>
             <a:r>
               <a:rPr lang="en-CA" dirty="0"/>
-              <a:t>Evidence of multi-modality</a:t>
-            </a:r>
+              <a:t>Calibrate TDR data using </a:t>
+            </a:r>
+            <a:r>
+              <a:rPr lang="en-CA" dirty="0" err="1">
+                <a:latin typeface="Lucida Console" panose="020B0609040504020204" pitchFamily="49" charset="0"/>
+              </a:rPr>
+              <a:t>calibrateDepth</a:t>
+            </a:r>
+            <a:endParaRPr lang="en-CA" dirty="0">
+              <a:latin typeface="Lucida Console" panose="020B0609040504020204" pitchFamily="49" charset="0"/>
+            </a:endParaRPr>
           </a:p>
           <a:p>
             <a:pPr marL="907200" lvl="1" indent="-457200">
@@ -4110,75 +4132,64 @@
             </a:pPr>
             <a:r>
               <a:rPr lang="en-CA" dirty="0"/>
-              <a:t>Some autocorrelation</a:t>
-            </a:r>
-          </a:p>
-          <a:p>
-            <a:pPr marL="907200" lvl="1" indent="-457200">
+              <a:t>Calculate dive statistics using </a:t>
+            </a:r>
+            <a:r>
+              <a:rPr lang="en-CA" dirty="0" err="1">
+                <a:latin typeface="Lucida Console" panose="020B0609040504020204" pitchFamily="49" charset="0"/>
+              </a:rPr>
+              <a:t>diveStats</a:t>
+            </a:r>
+            <a:endParaRPr lang="en-US" dirty="0"/>
+          </a:p>
+          <a:p>
+            <a:r>
+              <a:rPr lang="en-CA" dirty="0"/>
+              <a:t>Combine data streams with different resolutions</a:t>
+            </a:r>
+          </a:p>
+          <a:p>
+            <a:pPr marL="964350" lvl="1" indent="-514350">
               <a:buFont typeface="+mj-lt"/>
               <a:buAutoNum type="arabicPeriod"/>
             </a:pPr>
             <a:r>
               <a:rPr lang="en-CA" dirty="0"/>
-              <a:t>Minimal co-linearity</a:t>
-            </a:r>
-          </a:p>
-          <a:p>
-            <a:r>
-              <a:rPr lang="en-CA" dirty="0"/>
-              <a:t>Fitting HMM with several data streams</a:t>
-            </a:r>
-          </a:p>
-          <a:p>
-            <a:pPr marL="907200" lvl="1" indent="-457200">
+              <a:t>Summarise dive stats using </a:t>
+            </a:r>
+            <a:r>
+              <a:rPr lang="en-CA" dirty="0" err="1">
+                <a:latin typeface="Lucida Console" panose="020B0609040504020204" pitchFamily="49" charset="0"/>
+              </a:rPr>
+              <a:t>dplyr</a:t>
+            </a:r>
+            <a:r>
+              <a:rPr lang="en-CA" dirty="0">
+                <a:latin typeface="Lucida Console" panose="020B0609040504020204" pitchFamily="49" charset="0"/>
+              </a:rPr>
+              <a:t>:: summarise</a:t>
+            </a:r>
+          </a:p>
+          <a:p>
+            <a:pPr marL="964350" lvl="1" indent="-514350">
               <a:buFont typeface="+mj-lt"/>
               <a:buAutoNum type="arabicPeriod"/>
             </a:pPr>
-            <a:r>
-              <a:rPr lang="en-CA" dirty="0"/>
-              <a:t>Fit simple models to each data stream separately</a:t>
-            </a:r>
-          </a:p>
-          <a:p>
-            <a:pPr marL="907200" lvl="1" indent="-457200">
-              <a:buFont typeface="+mj-lt"/>
-              <a:buAutoNum type="arabicPeriod"/>
-            </a:pPr>
-            <a:r>
-              <a:rPr lang="en-CA" dirty="0"/>
-              <a:t>Get starting parameters from simpler models using  </a:t>
-            </a:r>
-            <a:r>
-              <a:rPr lang="en-CA" dirty="0" err="1">
-                <a:latin typeface="Lucida Console" panose="020B0609040504020204" pitchFamily="49" charset="0"/>
-              </a:rPr>
-              <a:t>getPar</a:t>
-            </a:r>
             <a:endParaRPr lang="en-CA" dirty="0">
               <a:latin typeface="Lucida Console" panose="020B0609040504020204" pitchFamily="49" charset="0"/>
             </a:endParaRPr>
           </a:p>
           <a:p>
-            <a:pPr marL="907200" lvl="1" indent="-457200">
-              <a:buFont typeface="+mj-lt"/>
-              <a:buAutoNum type="arabicPeriod"/>
+            <a:pPr marL="450000" lvl="1" indent="0">
+              <a:buNone/>
             </a:pPr>
             <a:r>
-              <a:rPr lang="en-CA" dirty="0"/>
-              <a:t>Fit with </a:t>
-            </a:r>
-            <a:r>
-              <a:rPr lang="en-CA" dirty="0" err="1">
+              <a:rPr lang="en-CA" dirty="0">
                 <a:latin typeface="Lucida Console" panose="020B0609040504020204" pitchFamily="49" charset="0"/>
               </a:rPr>
-              <a:t>fitHMM</a:t>
-            </a:r>
-            <a:endParaRPr lang="en-US" dirty="0">
-              <a:latin typeface="Lucida Console" panose="020B0609040504020204" pitchFamily="49" charset="0"/>
-            </a:endParaRPr>
-          </a:p>
-          <a:p>
-            <a:endParaRPr lang="en-US" dirty="0"/>
+              <a:t>Add Plot of dive label with different dive metrics</a:t>
+            </a:r>
+            <a:endParaRPr lang="en-CA" dirty="0"/>
           </a:p>
         </p:txBody>
       </p:sp>
@@ -4187,7 +4198,7 @@
           <p:cNvPr id="3" name="Slide Number Placeholder 2">
             <a:extLst>
               <a:ext uri="{FF2B5EF4-FFF2-40B4-BE49-F238E27FC236}">
-                <a16:creationId xmlns:a16="http://schemas.microsoft.com/office/drawing/2014/main" id="{435B0043-24DC-4037-961E-F5D3E3A75F2F}"/>
+                <a16:creationId xmlns:a16="http://schemas.microsoft.com/office/drawing/2014/main" id="{7C61CF3A-D551-413D-B565-0B044BDD2B19}"/>
               </a:ext>
             </a:extLst>
           </p:cNvPr>
@@ -4217,7 +4228,7 @@
           <p:cNvPr id="4" name="Title 3">
             <a:extLst>
               <a:ext uri="{FF2B5EF4-FFF2-40B4-BE49-F238E27FC236}">
-                <a16:creationId xmlns:a16="http://schemas.microsoft.com/office/drawing/2014/main" id="{A1639CBB-823B-4AAC-99AE-A4BF05F9AB32}"/>
+                <a16:creationId xmlns:a16="http://schemas.microsoft.com/office/drawing/2014/main" id="{8173C622-1A8A-4EB6-9EA1-A634F4D6C0A7}"/>
               </a:ext>
             </a:extLst>
           </p:cNvPr>
@@ -4235,7 +4246,7 @@
           <a:p>
             <a:r>
               <a:rPr lang="en-CA" dirty="0"/>
-              <a:t>4. Integrating dive data – Cont.</a:t>
+              <a:t>4. Integrating dive data</a:t>
             </a:r>
             <a:endParaRPr lang="en-US" dirty="0"/>
           </a:p>
@@ -4244,7 +4255,7 @@
     </p:spTree>
     <p:extLst>
       <p:ext uri="{BB962C8B-B14F-4D97-AF65-F5344CB8AC3E}">
-        <p14:creationId xmlns:p14="http://schemas.microsoft.com/office/powerpoint/2010/main" val="3011704582"/>
+        <p14:creationId xmlns:p14="http://schemas.microsoft.com/office/powerpoint/2010/main" val="83839828"/>
       </p:ext>
     </p:extLst>
   </p:cSld>
@@ -4558,33 +4569,15 @@
                                   </p:childTnLst>
                                 </p:cTn>
                               </p:par>
-                            </p:childTnLst>
-                          </p:cTn>
-                        </p:par>
-                      </p:childTnLst>
-                    </p:cTn>
-                  </p:par>
-                  <p:par>
-                    <p:cTn id="28" fill="hold">
-                      <p:stCondLst>
-                        <p:cond delay="indefinite"/>
-                      </p:stCondLst>
-                      <p:childTnLst>
-                        <p:par>
-                          <p:cTn id="29" fill="hold">
-                            <p:stCondLst>
-                              <p:cond delay="0"/>
-                            </p:stCondLst>
-                            <p:childTnLst>
                               <p:par>
-                                <p:cTn id="30" presetID="10" presetClass="entr" presetSubtype="0" fill="hold" grpId="0" nodeType="clickEffect">
+                                <p:cTn id="28" presetID="10" presetClass="entr" presetSubtype="0" fill="hold" grpId="0" nodeType="withEffect">
                                   <p:stCondLst>
                                     <p:cond delay="0"/>
                                   </p:stCondLst>
                                   <p:childTnLst>
                                     <p:set>
                                       <p:cBhvr>
-                                        <p:cTn id="31" dur="1" fill="hold">
+                                        <p:cTn id="29" dur="1" fill="hold">
                                           <p:stCondLst>
                                             <p:cond delay="0"/>
                                           </p:stCondLst>
@@ -4606,7 +4599,7 @@
                                     </p:set>
                                     <p:animEffect transition="in" filter="fade">
                                       <p:cBhvr>
-                                        <p:cTn id="32" dur="500"/>
+                                        <p:cTn id="30" dur="500"/>
                                         <p:tgtEl>
                                           <p:spTgt spid="2">
                                             <p:txEl>
@@ -4619,33 +4612,15 @@
                                   </p:childTnLst>
                                 </p:cTn>
                               </p:par>
-                            </p:childTnLst>
-                          </p:cTn>
-                        </p:par>
-                      </p:childTnLst>
-                    </p:cTn>
-                  </p:par>
-                  <p:par>
-                    <p:cTn id="33" fill="hold">
-                      <p:stCondLst>
-                        <p:cond delay="indefinite"/>
-                      </p:stCondLst>
-                      <p:childTnLst>
-                        <p:par>
-                          <p:cTn id="34" fill="hold">
-                            <p:stCondLst>
-                              <p:cond delay="0"/>
-                            </p:stCondLst>
-                            <p:childTnLst>
                               <p:par>
-                                <p:cTn id="35" presetID="10" presetClass="entr" presetSubtype="0" fill="hold" grpId="0" nodeType="clickEffect">
+                                <p:cTn id="31" presetID="10" presetClass="entr" presetSubtype="0" fill="hold" grpId="0" nodeType="withEffect">
                                   <p:stCondLst>
                                     <p:cond delay="0"/>
                                   </p:stCondLst>
                                   <p:childTnLst>
                                     <p:set>
                                       <p:cBhvr>
-                                        <p:cTn id="36" dur="1" fill="hold">
+                                        <p:cTn id="32" dur="1" fill="hold">
                                           <p:stCondLst>
                                             <p:cond delay="0"/>
                                           </p:stCondLst>
@@ -4653,7 +4628,7 @@
                                         <p:tgtEl>
                                           <p:spTgt spid="2">
                                             <p:txEl>
-                                              <p:pRg st="6" end="6"/>
+                                              <p:pRg st="7" end="7"/>
                                             </p:txEl>
                                           </p:spTgt>
                                         </p:tgtEl>
@@ -4667,133 +4642,11 @@
                                     </p:set>
                                     <p:animEffect transition="in" filter="fade">
                                       <p:cBhvr>
-                                        <p:cTn id="37" dur="500"/>
+                                        <p:cTn id="33" dur="500"/>
                                         <p:tgtEl>
                                           <p:spTgt spid="2">
                                             <p:txEl>
-                                              <p:pRg st="6" end="6"/>
-                                            </p:txEl>
-                                          </p:spTgt>
-                                        </p:tgtEl>
-                                      </p:cBhvr>
-                                    </p:animEffect>
-                                  </p:childTnLst>
-                                </p:cTn>
-                              </p:par>
-                            </p:childTnLst>
-                          </p:cTn>
-                        </p:par>
-                      </p:childTnLst>
-                    </p:cTn>
-                  </p:par>
-                  <p:par>
-                    <p:cTn id="38" fill="hold">
-                      <p:stCondLst>
-                        <p:cond delay="indefinite"/>
-                      </p:stCondLst>
-                      <p:childTnLst>
-                        <p:par>
-                          <p:cTn id="39" fill="hold">
-                            <p:stCondLst>
-                              <p:cond delay="0"/>
-                            </p:stCondLst>
-                            <p:childTnLst>
-                              <p:par>
-                                <p:cTn id="40" presetID="10" presetClass="entr" presetSubtype="0" fill="hold" grpId="0" nodeType="clickEffect">
-                                  <p:stCondLst>
-                                    <p:cond delay="0"/>
-                                  </p:stCondLst>
-                                  <p:childTnLst>
-                                    <p:set>
-                                      <p:cBhvr>
-                                        <p:cTn id="41" dur="1" fill="hold">
-                                          <p:stCondLst>
-                                            <p:cond delay="0"/>
-                                          </p:stCondLst>
-                                        </p:cTn>
-                                        <p:tgtEl>
-                                          <p:spTgt spid="2">
-                                            <p:txEl>
                                               <p:pRg st="7" end="7"/>
-                                            </p:txEl>
-                                          </p:spTgt>
-                                        </p:tgtEl>
-                                        <p:attrNameLst>
-                                          <p:attrName>style.visibility</p:attrName>
-                                        </p:attrNameLst>
-                                      </p:cBhvr>
-                                      <p:to>
-                                        <p:strVal val="visible"/>
-                                      </p:to>
-                                    </p:set>
-                                    <p:animEffect transition="in" filter="fade">
-                                      <p:cBhvr>
-                                        <p:cTn id="42" dur="500"/>
-                                        <p:tgtEl>
-                                          <p:spTgt spid="2">
-                                            <p:txEl>
-                                              <p:pRg st="7" end="7"/>
-                                            </p:txEl>
-                                          </p:spTgt>
-                                        </p:tgtEl>
-                                      </p:cBhvr>
-                                    </p:animEffect>
-                                  </p:childTnLst>
-                                </p:cTn>
-                              </p:par>
-                            </p:childTnLst>
-                          </p:cTn>
-                        </p:par>
-                      </p:childTnLst>
-                    </p:cTn>
-                  </p:par>
-                  <p:par>
-                    <p:cTn id="43" fill="hold">
-                      <p:stCondLst>
-                        <p:cond delay="indefinite"/>
-                      </p:stCondLst>
-                      <p:childTnLst>
-                        <p:par>
-                          <p:cTn id="44" fill="hold">
-                            <p:stCondLst>
-                              <p:cond delay="0"/>
-                            </p:stCondLst>
-                            <p:childTnLst>
-                              <p:par>
-                                <p:cTn id="45" presetID="10" presetClass="entr" presetSubtype="0" fill="hold" grpId="0" nodeType="clickEffect">
-                                  <p:stCondLst>
-                                    <p:cond delay="0"/>
-                                  </p:stCondLst>
-                                  <p:childTnLst>
-                                    <p:set>
-                                      <p:cBhvr>
-                                        <p:cTn id="46" dur="1" fill="hold">
-                                          <p:stCondLst>
-                                            <p:cond delay="0"/>
-                                          </p:stCondLst>
-                                        </p:cTn>
-                                        <p:tgtEl>
-                                          <p:spTgt spid="2">
-                                            <p:txEl>
-                                              <p:pRg st="8" end="8"/>
-                                            </p:txEl>
-                                          </p:spTgt>
-                                        </p:tgtEl>
-                                        <p:attrNameLst>
-                                          <p:attrName>style.visibility</p:attrName>
-                                        </p:attrNameLst>
-                                      </p:cBhvr>
-                                      <p:to>
-                                        <p:strVal val="visible"/>
-                                      </p:to>
-                                    </p:set>
-                                    <p:animEffect transition="in" filter="fade">
-                                      <p:cBhvr>
-                                        <p:cTn id="47" dur="500"/>
-                                        <p:tgtEl>
-                                          <p:spTgt spid="2">
-                                            <p:txEl>
-                                              <p:pRg st="8" end="8"/>
                                             </p:txEl>
                                           </p:spTgt>
                                         </p:tgtEl>
@@ -4858,6 +4711,809 @@
           <p:cNvPr id="2" name="Content Placeholder 1">
             <a:extLst>
               <a:ext uri="{FF2B5EF4-FFF2-40B4-BE49-F238E27FC236}">
+                <a16:creationId xmlns:a16="http://schemas.microsoft.com/office/drawing/2014/main" id="{4AE96CCD-2BB8-4A31-8EEF-6888B51122A5}"/>
+              </a:ext>
+            </a:extLst>
+          </p:cNvPr>
+          <p:cNvSpPr>
+            <a:spLocks noGrp="1"/>
+          </p:cNvSpPr>
+          <p:nvPr>
+            <p:ph idx="1"/>
+          </p:nvPr>
+        </p:nvSpPr>
+        <p:spPr>
+          <a:xfrm>
+            <a:off x="623947" y="1431144"/>
+            <a:ext cx="10944109" cy="5179206"/>
+          </a:xfrm>
+        </p:spPr>
+        <p:txBody>
+          <a:bodyPr>
+            <a:normAutofit/>
+          </a:bodyPr>
+          <a:lstStyle/>
+          <a:p>
+            <a:r>
+              <a:rPr lang="en-CA" dirty="0"/>
+              <a:t>Selecting data streams</a:t>
+            </a:r>
+          </a:p>
+          <a:p>
+            <a:pPr marL="907200" lvl="1" indent="-457200">
+              <a:buFont typeface="+mj-lt"/>
+              <a:buAutoNum type="arabicPeriod"/>
+            </a:pPr>
+            <a:r>
+              <a:rPr lang="en-CA" dirty="0"/>
+              <a:t>Minimal missing data</a:t>
+            </a:r>
+          </a:p>
+          <a:p>
+            <a:pPr marL="907200" lvl="1" indent="-457200">
+              <a:buFont typeface="+mj-lt"/>
+              <a:buAutoNum type="arabicPeriod"/>
+            </a:pPr>
+            <a:r>
+              <a:rPr lang="en-CA" dirty="0"/>
+              <a:t>Evidence of multi-modality</a:t>
+            </a:r>
+          </a:p>
+          <a:p>
+            <a:pPr marL="907200" lvl="1" indent="-457200">
+              <a:buFont typeface="+mj-lt"/>
+              <a:buAutoNum type="arabicPeriod"/>
+            </a:pPr>
+            <a:r>
+              <a:rPr lang="en-CA" dirty="0"/>
+              <a:t>Some autocorrelation</a:t>
+            </a:r>
+          </a:p>
+          <a:p>
+            <a:pPr marL="907200" lvl="1" indent="-457200">
+              <a:buFont typeface="+mj-lt"/>
+              <a:buAutoNum type="arabicPeriod"/>
+            </a:pPr>
+            <a:r>
+              <a:rPr lang="en-CA" dirty="0"/>
+              <a:t>Minimal co-linearity</a:t>
+            </a:r>
+          </a:p>
+          <a:p>
+            <a:r>
+              <a:rPr lang="en-CA" dirty="0"/>
+              <a:t>Fitting HMM with several data streams</a:t>
+            </a:r>
+          </a:p>
+          <a:p>
+            <a:pPr marL="907200" lvl="1" indent="-457200">
+              <a:buFont typeface="+mj-lt"/>
+              <a:buAutoNum type="arabicPeriod"/>
+            </a:pPr>
+            <a:r>
+              <a:rPr lang="en-CA" dirty="0"/>
+              <a:t>Fit simple models to each data stream separately</a:t>
+            </a:r>
+          </a:p>
+          <a:p>
+            <a:pPr marL="907200" lvl="1" indent="-457200">
+              <a:buFont typeface="+mj-lt"/>
+              <a:buAutoNum type="arabicPeriod"/>
+            </a:pPr>
+            <a:r>
+              <a:rPr lang="en-CA" dirty="0"/>
+              <a:t>Get starting parameters from simpler models using  </a:t>
+            </a:r>
+            <a:r>
+              <a:rPr lang="en-CA" dirty="0" err="1">
+                <a:latin typeface="Lucida Console" panose="020B0609040504020204" pitchFamily="49" charset="0"/>
+              </a:rPr>
+              <a:t>getPar</a:t>
+            </a:r>
+            <a:endParaRPr lang="en-CA" dirty="0">
+              <a:latin typeface="Lucida Console" panose="020B0609040504020204" pitchFamily="49" charset="0"/>
+            </a:endParaRPr>
+          </a:p>
+          <a:p>
+            <a:pPr marL="907200" lvl="1" indent="-457200">
+              <a:buFont typeface="+mj-lt"/>
+              <a:buAutoNum type="arabicPeriod"/>
+            </a:pPr>
+            <a:r>
+              <a:rPr lang="en-CA" dirty="0"/>
+              <a:t>Fit with </a:t>
+            </a:r>
+            <a:r>
+              <a:rPr lang="en-CA" dirty="0" err="1">
+                <a:latin typeface="Lucida Console" panose="020B0609040504020204" pitchFamily="49" charset="0"/>
+              </a:rPr>
+              <a:t>fitHMM</a:t>
+            </a:r>
+            <a:endParaRPr lang="en-US" dirty="0">
+              <a:latin typeface="Lucida Console" panose="020B0609040504020204" pitchFamily="49" charset="0"/>
+            </a:endParaRPr>
+          </a:p>
+          <a:p>
+            <a:endParaRPr lang="en-US" dirty="0"/>
+          </a:p>
+        </p:txBody>
+      </p:sp>
+      <p:sp>
+        <p:nvSpPr>
+          <p:cNvPr id="3" name="Slide Number Placeholder 2">
+            <a:extLst>
+              <a:ext uri="{FF2B5EF4-FFF2-40B4-BE49-F238E27FC236}">
+                <a16:creationId xmlns:a16="http://schemas.microsoft.com/office/drawing/2014/main" id="{435B0043-24DC-4037-961E-F5D3E3A75F2F}"/>
+              </a:ext>
+            </a:extLst>
+          </p:cNvPr>
+          <p:cNvSpPr>
+            <a:spLocks noGrp="1"/>
+          </p:cNvSpPr>
+          <p:nvPr>
+            <p:ph type="sldNum" sz="quarter" idx="12"/>
+          </p:nvPr>
+        </p:nvSpPr>
+        <p:spPr/>
+        <p:txBody>
+          <a:bodyPr/>
+          <a:lstStyle/>
+          <a:p>
+            <a:fld id="{E50A8D5F-7A10-4D19-B2BD-04FE5CA3B31F}" type="slidenum">
+              <a:rPr lang="en-US" smtClean="0"/>
+              <a:pPr/>
+              <a:t>11</a:t>
+            </a:fld>
+            <a:endParaRPr lang="en-US" dirty="0"/>
+          </a:p>
+        </p:txBody>
+      </p:sp>
+      <p:sp>
+        <p:nvSpPr>
+          <p:cNvPr id="4" name="Title 3">
+            <a:extLst>
+              <a:ext uri="{FF2B5EF4-FFF2-40B4-BE49-F238E27FC236}">
+                <a16:creationId xmlns:a16="http://schemas.microsoft.com/office/drawing/2014/main" id="{A1639CBB-823B-4AAC-99AE-A4BF05F9AB32}"/>
+              </a:ext>
+            </a:extLst>
+          </p:cNvPr>
+          <p:cNvSpPr>
+            <a:spLocks noGrp="1"/>
+          </p:cNvSpPr>
+          <p:nvPr>
+            <p:ph type="title"/>
+          </p:nvPr>
+        </p:nvSpPr>
+        <p:spPr/>
+        <p:txBody>
+          <a:bodyPr/>
+          <a:lstStyle/>
+          <a:p>
+            <a:r>
+              <a:rPr lang="en-CA" dirty="0"/>
+              <a:t>4. Integrating dive data – Cont.</a:t>
+            </a:r>
+            <a:endParaRPr lang="en-US" dirty="0"/>
+          </a:p>
+        </p:txBody>
+      </p:sp>
+    </p:spTree>
+    <p:extLst>
+      <p:ext uri="{BB962C8B-B14F-4D97-AF65-F5344CB8AC3E}">
+        <p14:creationId xmlns:p14="http://schemas.microsoft.com/office/powerpoint/2010/main" val="3011704582"/>
+      </p:ext>
+    </p:extLst>
+  </p:cSld>
+  <p:clrMapOvr>
+    <a:masterClrMapping/>
+  </p:clrMapOvr>
+  <p:timing>
+    <p:tnLst>
+      <p:par>
+        <p:cTn id="1" dur="indefinite" restart="never" nodeType="tmRoot">
+          <p:childTnLst>
+            <p:seq concurrent="1" nextAc="seek">
+              <p:cTn id="2" dur="indefinite" nodeType="mainSeq">
+                <p:childTnLst>
+                  <p:par>
+                    <p:cTn id="3" fill="hold">
+                      <p:stCondLst>
+                        <p:cond delay="indefinite"/>
+                      </p:stCondLst>
+                      <p:childTnLst>
+                        <p:par>
+                          <p:cTn id="4" fill="hold">
+                            <p:stCondLst>
+                              <p:cond delay="0"/>
+                            </p:stCondLst>
+                            <p:childTnLst>
+                              <p:par>
+                                <p:cTn id="5" presetID="10" presetClass="entr" presetSubtype="0" fill="hold" grpId="0" nodeType="clickEffect">
+                                  <p:stCondLst>
+                                    <p:cond delay="0"/>
+                                  </p:stCondLst>
+                                  <p:childTnLst>
+                                    <p:set>
+                                      <p:cBhvr>
+                                        <p:cTn id="6" dur="1" fill="hold">
+                                          <p:stCondLst>
+                                            <p:cond delay="0"/>
+                                          </p:stCondLst>
+                                        </p:cTn>
+                                        <p:tgtEl>
+                                          <p:spTgt spid="2">
+                                            <p:txEl>
+                                              <p:pRg st="0" end="0"/>
+                                            </p:txEl>
+                                          </p:spTgt>
+                                        </p:tgtEl>
+                                        <p:attrNameLst>
+                                          <p:attrName>style.visibility</p:attrName>
+                                        </p:attrNameLst>
+                                      </p:cBhvr>
+                                      <p:to>
+                                        <p:strVal val="visible"/>
+                                      </p:to>
+                                    </p:set>
+                                    <p:animEffect transition="in" filter="fade">
+                                      <p:cBhvr>
+                                        <p:cTn id="7" dur="500"/>
+                                        <p:tgtEl>
+                                          <p:spTgt spid="2">
+                                            <p:txEl>
+                                              <p:pRg st="0" end="0"/>
+                                            </p:txEl>
+                                          </p:spTgt>
+                                        </p:tgtEl>
+                                      </p:cBhvr>
+                                    </p:animEffect>
+                                  </p:childTnLst>
+                                </p:cTn>
+                              </p:par>
+                            </p:childTnLst>
+                          </p:cTn>
+                        </p:par>
+                      </p:childTnLst>
+                    </p:cTn>
+                  </p:par>
+                  <p:par>
+                    <p:cTn id="8" fill="hold">
+                      <p:stCondLst>
+                        <p:cond delay="indefinite"/>
+                      </p:stCondLst>
+                      <p:childTnLst>
+                        <p:par>
+                          <p:cTn id="9" fill="hold">
+                            <p:stCondLst>
+                              <p:cond delay="0"/>
+                            </p:stCondLst>
+                            <p:childTnLst>
+                              <p:par>
+                                <p:cTn id="10" presetID="10" presetClass="entr" presetSubtype="0" fill="hold" grpId="0" nodeType="clickEffect">
+                                  <p:stCondLst>
+                                    <p:cond delay="0"/>
+                                  </p:stCondLst>
+                                  <p:childTnLst>
+                                    <p:set>
+                                      <p:cBhvr>
+                                        <p:cTn id="11" dur="1" fill="hold">
+                                          <p:stCondLst>
+                                            <p:cond delay="0"/>
+                                          </p:stCondLst>
+                                        </p:cTn>
+                                        <p:tgtEl>
+                                          <p:spTgt spid="2">
+                                            <p:txEl>
+                                              <p:pRg st="1" end="1"/>
+                                            </p:txEl>
+                                          </p:spTgt>
+                                        </p:tgtEl>
+                                        <p:attrNameLst>
+                                          <p:attrName>style.visibility</p:attrName>
+                                        </p:attrNameLst>
+                                      </p:cBhvr>
+                                      <p:to>
+                                        <p:strVal val="visible"/>
+                                      </p:to>
+                                    </p:set>
+                                    <p:animEffect transition="in" filter="fade">
+                                      <p:cBhvr>
+                                        <p:cTn id="12" dur="500"/>
+                                        <p:tgtEl>
+                                          <p:spTgt spid="2">
+                                            <p:txEl>
+                                              <p:pRg st="1" end="1"/>
+                                            </p:txEl>
+                                          </p:spTgt>
+                                        </p:tgtEl>
+                                      </p:cBhvr>
+                                    </p:animEffect>
+                                  </p:childTnLst>
+                                </p:cTn>
+                              </p:par>
+                            </p:childTnLst>
+                          </p:cTn>
+                        </p:par>
+                      </p:childTnLst>
+                    </p:cTn>
+                  </p:par>
+                  <p:par>
+                    <p:cTn id="13" fill="hold">
+                      <p:stCondLst>
+                        <p:cond delay="indefinite"/>
+                      </p:stCondLst>
+                      <p:childTnLst>
+                        <p:par>
+                          <p:cTn id="14" fill="hold">
+                            <p:stCondLst>
+                              <p:cond delay="0"/>
+                            </p:stCondLst>
+                            <p:childTnLst>
+                              <p:par>
+                                <p:cTn id="15" presetID="10" presetClass="entr" presetSubtype="0" fill="hold" grpId="0" nodeType="clickEffect">
+                                  <p:stCondLst>
+                                    <p:cond delay="0"/>
+                                  </p:stCondLst>
+                                  <p:childTnLst>
+                                    <p:set>
+                                      <p:cBhvr>
+                                        <p:cTn id="16" dur="1" fill="hold">
+                                          <p:stCondLst>
+                                            <p:cond delay="0"/>
+                                          </p:stCondLst>
+                                        </p:cTn>
+                                        <p:tgtEl>
+                                          <p:spTgt spid="2">
+                                            <p:txEl>
+                                              <p:pRg st="2" end="2"/>
+                                            </p:txEl>
+                                          </p:spTgt>
+                                        </p:tgtEl>
+                                        <p:attrNameLst>
+                                          <p:attrName>style.visibility</p:attrName>
+                                        </p:attrNameLst>
+                                      </p:cBhvr>
+                                      <p:to>
+                                        <p:strVal val="visible"/>
+                                      </p:to>
+                                    </p:set>
+                                    <p:animEffect transition="in" filter="fade">
+                                      <p:cBhvr>
+                                        <p:cTn id="17" dur="500"/>
+                                        <p:tgtEl>
+                                          <p:spTgt spid="2">
+                                            <p:txEl>
+                                              <p:pRg st="2" end="2"/>
+                                            </p:txEl>
+                                          </p:spTgt>
+                                        </p:tgtEl>
+                                      </p:cBhvr>
+                                    </p:animEffect>
+                                  </p:childTnLst>
+                                </p:cTn>
+                              </p:par>
+                            </p:childTnLst>
+                          </p:cTn>
+                        </p:par>
+                      </p:childTnLst>
+                    </p:cTn>
+                  </p:par>
+                  <p:par>
+                    <p:cTn id="18" fill="hold">
+                      <p:stCondLst>
+                        <p:cond delay="indefinite"/>
+                      </p:stCondLst>
+                      <p:childTnLst>
+                        <p:par>
+                          <p:cTn id="19" fill="hold">
+                            <p:stCondLst>
+                              <p:cond delay="0"/>
+                            </p:stCondLst>
+                            <p:childTnLst>
+                              <p:par>
+                                <p:cTn id="20" presetID="10" presetClass="entr" presetSubtype="0" fill="hold" grpId="0" nodeType="clickEffect">
+                                  <p:stCondLst>
+                                    <p:cond delay="0"/>
+                                  </p:stCondLst>
+                                  <p:childTnLst>
+                                    <p:set>
+                                      <p:cBhvr>
+                                        <p:cTn id="21" dur="1" fill="hold">
+                                          <p:stCondLst>
+                                            <p:cond delay="0"/>
+                                          </p:stCondLst>
+                                        </p:cTn>
+                                        <p:tgtEl>
+                                          <p:spTgt spid="2">
+                                            <p:txEl>
+                                              <p:pRg st="3" end="3"/>
+                                            </p:txEl>
+                                          </p:spTgt>
+                                        </p:tgtEl>
+                                        <p:attrNameLst>
+                                          <p:attrName>style.visibility</p:attrName>
+                                        </p:attrNameLst>
+                                      </p:cBhvr>
+                                      <p:to>
+                                        <p:strVal val="visible"/>
+                                      </p:to>
+                                    </p:set>
+                                    <p:animEffect transition="in" filter="fade">
+                                      <p:cBhvr>
+                                        <p:cTn id="22" dur="500"/>
+                                        <p:tgtEl>
+                                          <p:spTgt spid="2">
+                                            <p:txEl>
+                                              <p:pRg st="3" end="3"/>
+                                            </p:txEl>
+                                          </p:spTgt>
+                                        </p:tgtEl>
+                                      </p:cBhvr>
+                                    </p:animEffect>
+                                  </p:childTnLst>
+                                </p:cTn>
+                              </p:par>
+                            </p:childTnLst>
+                          </p:cTn>
+                        </p:par>
+                      </p:childTnLst>
+                    </p:cTn>
+                  </p:par>
+                  <p:par>
+                    <p:cTn id="23" fill="hold">
+                      <p:stCondLst>
+                        <p:cond delay="indefinite"/>
+                      </p:stCondLst>
+                      <p:childTnLst>
+                        <p:par>
+                          <p:cTn id="24" fill="hold">
+                            <p:stCondLst>
+                              <p:cond delay="0"/>
+                            </p:stCondLst>
+                            <p:childTnLst>
+                              <p:par>
+                                <p:cTn id="25" presetID="10" presetClass="entr" presetSubtype="0" fill="hold" grpId="0" nodeType="clickEffect">
+                                  <p:stCondLst>
+                                    <p:cond delay="0"/>
+                                  </p:stCondLst>
+                                  <p:childTnLst>
+                                    <p:set>
+                                      <p:cBhvr>
+                                        <p:cTn id="26" dur="1" fill="hold">
+                                          <p:stCondLst>
+                                            <p:cond delay="0"/>
+                                          </p:stCondLst>
+                                        </p:cTn>
+                                        <p:tgtEl>
+                                          <p:spTgt spid="2">
+                                            <p:txEl>
+                                              <p:pRg st="4" end="4"/>
+                                            </p:txEl>
+                                          </p:spTgt>
+                                        </p:tgtEl>
+                                        <p:attrNameLst>
+                                          <p:attrName>style.visibility</p:attrName>
+                                        </p:attrNameLst>
+                                      </p:cBhvr>
+                                      <p:to>
+                                        <p:strVal val="visible"/>
+                                      </p:to>
+                                    </p:set>
+                                    <p:animEffect transition="in" filter="fade">
+                                      <p:cBhvr>
+                                        <p:cTn id="27" dur="500"/>
+                                        <p:tgtEl>
+                                          <p:spTgt spid="2">
+                                            <p:txEl>
+                                              <p:pRg st="4" end="4"/>
+                                            </p:txEl>
+                                          </p:spTgt>
+                                        </p:tgtEl>
+                                      </p:cBhvr>
+                                    </p:animEffect>
+                                  </p:childTnLst>
+                                </p:cTn>
+                              </p:par>
+                            </p:childTnLst>
+                          </p:cTn>
+                        </p:par>
+                      </p:childTnLst>
+                    </p:cTn>
+                  </p:par>
+                  <p:par>
+                    <p:cTn id="28" fill="hold">
+                      <p:stCondLst>
+                        <p:cond delay="indefinite"/>
+                      </p:stCondLst>
+                      <p:childTnLst>
+                        <p:par>
+                          <p:cTn id="29" fill="hold">
+                            <p:stCondLst>
+                              <p:cond delay="0"/>
+                            </p:stCondLst>
+                            <p:childTnLst>
+                              <p:par>
+                                <p:cTn id="30" presetID="10" presetClass="entr" presetSubtype="0" fill="hold" grpId="0" nodeType="clickEffect">
+                                  <p:stCondLst>
+                                    <p:cond delay="0"/>
+                                  </p:stCondLst>
+                                  <p:childTnLst>
+                                    <p:set>
+                                      <p:cBhvr>
+                                        <p:cTn id="31" dur="1" fill="hold">
+                                          <p:stCondLst>
+                                            <p:cond delay="0"/>
+                                          </p:stCondLst>
+                                        </p:cTn>
+                                        <p:tgtEl>
+                                          <p:spTgt spid="2">
+                                            <p:txEl>
+                                              <p:pRg st="5" end="5"/>
+                                            </p:txEl>
+                                          </p:spTgt>
+                                        </p:tgtEl>
+                                        <p:attrNameLst>
+                                          <p:attrName>style.visibility</p:attrName>
+                                        </p:attrNameLst>
+                                      </p:cBhvr>
+                                      <p:to>
+                                        <p:strVal val="visible"/>
+                                      </p:to>
+                                    </p:set>
+                                    <p:animEffect transition="in" filter="fade">
+                                      <p:cBhvr>
+                                        <p:cTn id="32" dur="500"/>
+                                        <p:tgtEl>
+                                          <p:spTgt spid="2">
+                                            <p:txEl>
+                                              <p:pRg st="5" end="5"/>
+                                            </p:txEl>
+                                          </p:spTgt>
+                                        </p:tgtEl>
+                                      </p:cBhvr>
+                                    </p:animEffect>
+                                  </p:childTnLst>
+                                </p:cTn>
+                              </p:par>
+                            </p:childTnLst>
+                          </p:cTn>
+                        </p:par>
+                      </p:childTnLst>
+                    </p:cTn>
+                  </p:par>
+                  <p:par>
+                    <p:cTn id="33" fill="hold">
+                      <p:stCondLst>
+                        <p:cond delay="indefinite"/>
+                      </p:stCondLst>
+                      <p:childTnLst>
+                        <p:par>
+                          <p:cTn id="34" fill="hold">
+                            <p:stCondLst>
+                              <p:cond delay="0"/>
+                            </p:stCondLst>
+                            <p:childTnLst>
+                              <p:par>
+                                <p:cTn id="35" presetID="10" presetClass="entr" presetSubtype="0" fill="hold" grpId="0" nodeType="clickEffect">
+                                  <p:stCondLst>
+                                    <p:cond delay="0"/>
+                                  </p:stCondLst>
+                                  <p:childTnLst>
+                                    <p:set>
+                                      <p:cBhvr>
+                                        <p:cTn id="36" dur="1" fill="hold">
+                                          <p:stCondLst>
+                                            <p:cond delay="0"/>
+                                          </p:stCondLst>
+                                        </p:cTn>
+                                        <p:tgtEl>
+                                          <p:spTgt spid="2">
+                                            <p:txEl>
+                                              <p:pRg st="6" end="6"/>
+                                            </p:txEl>
+                                          </p:spTgt>
+                                        </p:tgtEl>
+                                        <p:attrNameLst>
+                                          <p:attrName>style.visibility</p:attrName>
+                                        </p:attrNameLst>
+                                      </p:cBhvr>
+                                      <p:to>
+                                        <p:strVal val="visible"/>
+                                      </p:to>
+                                    </p:set>
+                                    <p:animEffect transition="in" filter="fade">
+                                      <p:cBhvr>
+                                        <p:cTn id="37" dur="500"/>
+                                        <p:tgtEl>
+                                          <p:spTgt spid="2">
+                                            <p:txEl>
+                                              <p:pRg st="6" end="6"/>
+                                            </p:txEl>
+                                          </p:spTgt>
+                                        </p:tgtEl>
+                                      </p:cBhvr>
+                                    </p:animEffect>
+                                  </p:childTnLst>
+                                </p:cTn>
+                              </p:par>
+                            </p:childTnLst>
+                          </p:cTn>
+                        </p:par>
+                      </p:childTnLst>
+                    </p:cTn>
+                  </p:par>
+                  <p:par>
+                    <p:cTn id="38" fill="hold">
+                      <p:stCondLst>
+                        <p:cond delay="indefinite"/>
+                      </p:stCondLst>
+                      <p:childTnLst>
+                        <p:par>
+                          <p:cTn id="39" fill="hold">
+                            <p:stCondLst>
+                              <p:cond delay="0"/>
+                            </p:stCondLst>
+                            <p:childTnLst>
+                              <p:par>
+                                <p:cTn id="40" presetID="10" presetClass="entr" presetSubtype="0" fill="hold" grpId="0" nodeType="clickEffect">
+                                  <p:stCondLst>
+                                    <p:cond delay="0"/>
+                                  </p:stCondLst>
+                                  <p:childTnLst>
+                                    <p:set>
+                                      <p:cBhvr>
+                                        <p:cTn id="41" dur="1" fill="hold">
+                                          <p:stCondLst>
+                                            <p:cond delay="0"/>
+                                          </p:stCondLst>
+                                        </p:cTn>
+                                        <p:tgtEl>
+                                          <p:spTgt spid="2">
+                                            <p:txEl>
+                                              <p:pRg st="7" end="7"/>
+                                            </p:txEl>
+                                          </p:spTgt>
+                                        </p:tgtEl>
+                                        <p:attrNameLst>
+                                          <p:attrName>style.visibility</p:attrName>
+                                        </p:attrNameLst>
+                                      </p:cBhvr>
+                                      <p:to>
+                                        <p:strVal val="visible"/>
+                                      </p:to>
+                                    </p:set>
+                                    <p:animEffect transition="in" filter="fade">
+                                      <p:cBhvr>
+                                        <p:cTn id="42" dur="500"/>
+                                        <p:tgtEl>
+                                          <p:spTgt spid="2">
+                                            <p:txEl>
+                                              <p:pRg st="7" end="7"/>
+                                            </p:txEl>
+                                          </p:spTgt>
+                                        </p:tgtEl>
+                                      </p:cBhvr>
+                                    </p:animEffect>
+                                  </p:childTnLst>
+                                </p:cTn>
+                              </p:par>
+                            </p:childTnLst>
+                          </p:cTn>
+                        </p:par>
+                      </p:childTnLst>
+                    </p:cTn>
+                  </p:par>
+                  <p:par>
+                    <p:cTn id="43" fill="hold">
+                      <p:stCondLst>
+                        <p:cond delay="indefinite"/>
+                      </p:stCondLst>
+                      <p:childTnLst>
+                        <p:par>
+                          <p:cTn id="44" fill="hold">
+                            <p:stCondLst>
+                              <p:cond delay="0"/>
+                            </p:stCondLst>
+                            <p:childTnLst>
+                              <p:par>
+                                <p:cTn id="45" presetID="10" presetClass="entr" presetSubtype="0" fill="hold" grpId="0" nodeType="clickEffect">
+                                  <p:stCondLst>
+                                    <p:cond delay="0"/>
+                                  </p:stCondLst>
+                                  <p:childTnLst>
+                                    <p:set>
+                                      <p:cBhvr>
+                                        <p:cTn id="46" dur="1" fill="hold">
+                                          <p:stCondLst>
+                                            <p:cond delay="0"/>
+                                          </p:stCondLst>
+                                        </p:cTn>
+                                        <p:tgtEl>
+                                          <p:spTgt spid="2">
+                                            <p:txEl>
+                                              <p:pRg st="8" end="8"/>
+                                            </p:txEl>
+                                          </p:spTgt>
+                                        </p:tgtEl>
+                                        <p:attrNameLst>
+                                          <p:attrName>style.visibility</p:attrName>
+                                        </p:attrNameLst>
+                                      </p:cBhvr>
+                                      <p:to>
+                                        <p:strVal val="visible"/>
+                                      </p:to>
+                                    </p:set>
+                                    <p:animEffect transition="in" filter="fade">
+                                      <p:cBhvr>
+                                        <p:cTn id="47" dur="500"/>
+                                        <p:tgtEl>
+                                          <p:spTgt spid="2">
+                                            <p:txEl>
+                                              <p:pRg st="8" end="8"/>
+                                            </p:txEl>
+                                          </p:spTgt>
+                                        </p:tgtEl>
+                                      </p:cBhvr>
+                                    </p:animEffect>
+                                  </p:childTnLst>
+                                </p:cTn>
+                              </p:par>
+                            </p:childTnLst>
+                          </p:cTn>
+                        </p:par>
+                      </p:childTnLst>
+                    </p:cTn>
+                  </p:par>
+                </p:childTnLst>
+              </p:cTn>
+              <p:prevCondLst>
+                <p:cond evt="onPrev" delay="0">
+                  <p:tgtEl>
+                    <p:sldTgt/>
+                  </p:tgtEl>
+                </p:cond>
+              </p:prevCondLst>
+              <p:nextCondLst>
+                <p:cond evt="onNext" delay="0">
+                  <p:tgtEl>
+                    <p:sldTgt/>
+                  </p:tgtEl>
+                </p:cond>
+              </p:nextCondLst>
+            </p:seq>
+          </p:childTnLst>
+        </p:cTn>
+      </p:par>
+    </p:tnLst>
+    <p:bldLst>
+      <p:bldP spid="2" grpId="0" uiExpand="1" build="p"/>
+    </p:bldLst>
+  </p:timing>
+</p:sld>
+</file>
+
+<file path=ppt/slides/slide12.xml><?xml version="1.0" encoding="utf-8"?>
+<p:sld xmlns:a="http://schemas.openxmlformats.org/drawingml/2006/main" xmlns:r="http://schemas.openxmlformats.org/officeDocument/2006/relationships" xmlns:p="http://schemas.openxmlformats.org/presentationml/2006/main">
+  <p:cSld>
+    <p:spTree>
+      <p:nvGrpSpPr>
+        <p:cNvPr id="1" name=""/>
+        <p:cNvGrpSpPr/>
+        <p:nvPr/>
+      </p:nvGrpSpPr>
+      <p:grpSpPr>
+        <a:xfrm>
+          <a:off x="0" y="0"/>
+          <a:ext cx="0" cy="0"/>
+          <a:chOff x="0" y="0"/>
+          <a:chExt cx="0" cy="0"/>
+        </a:xfrm>
+      </p:grpSpPr>
+      <p:sp>
+        <p:nvSpPr>
+          <p:cNvPr id="2" name="Content Placeholder 1">
+            <a:extLst>
+              <a:ext uri="{FF2B5EF4-FFF2-40B4-BE49-F238E27FC236}">
                 <a16:creationId xmlns:a16="http://schemas.microsoft.com/office/drawing/2014/main" id="{16F73B2F-DA1B-4F98-9315-B7A693CB9653}"/>
               </a:ext>
             </a:extLst>
@@ -4906,7 +5562,7 @@
             <a:fld id="{E50A8D5F-7A10-4D19-B2BD-04FE5CA3B31F}" type="slidenum">
               <a:rPr lang="en-US" smtClean="0"/>
               <a:pPr/>
-              <a:t>11</a:t>
+              <a:t>12</a:t>
             </a:fld>
             <a:endParaRPr lang="en-US" dirty="0"/>
           </a:p>
@@ -4979,35 +5635,6 @@
           <a:chExt cx="0" cy="0"/>
         </a:xfrm>
       </p:grpSpPr>
-      <p:pic>
-        <p:nvPicPr>
-          <p:cNvPr id="5" name="Picture 4">
-            <a:extLst>
-              <a:ext uri="{FF2B5EF4-FFF2-40B4-BE49-F238E27FC236}">
-                <a16:creationId xmlns:a16="http://schemas.microsoft.com/office/drawing/2014/main" id="{E658F934-FD4D-4B65-B04C-60502CCC9139}"/>
-              </a:ext>
-            </a:extLst>
-          </p:cNvPr>
-          <p:cNvPicPr>
-            <a:picLocks noChangeAspect="1"/>
-          </p:cNvPicPr>
-          <p:nvPr/>
-        </p:nvPicPr>
-        <p:blipFill rotWithShape="1">
-          <a:blip r:embed="rId2"/>
-          <a:srcRect l="12390" r="19663"/>
-          <a:stretch/>
-        </p:blipFill>
-        <p:spPr>
-          <a:xfrm>
-            <a:off x="5511772" y="1549207"/>
-            <a:ext cx="6032266" cy="3575948"/>
-          </a:xfrm>
-          <a:prstGeom prst="rect">
-            <a:avLst/>
-          </a:prstGeom>
-        </p:spPr>
-      </p:pic>
       <p:sp>
         <p:nvSpPr>
           <p:cNvPr id="2" name="Content Placeholder 1">
@@ -5035,11 +5662,12 @@
           <a:lstStyle/>
           <a:p>
             <a:pPr marL="514350" indent="-514350">
+              <a:buFont typeface="Quicksand" panose="02070303000000060000" pitchFamily="18" charset="0"/>
               <a:buAutoNum type="arabicPeriod"/>
             </a:pPr>
             <a:r>
               <a:rPr lang="en-CA" dirty="0"/>
-              <a:t>Open HTML tutorial for Day 2</a:t>
+              <a:t>Open R and set the working directory to the “Day2” folder</a:t>
             </a:r>
           </a:p>
           <a:p>
@@ -5117,10 +5745,10 @@
       </p:sp>
       <p:sp>
         <p:nvSpPr>
-          <p:cNvPr id="8" name="Oval 7">
+          <p:cNvPr id="10" name="Freeform: Shape 9">
             <a:extLst>
               <a:ext uri="{FF2B5EF4-FFF2-40B4-BE49-F238E27FC236}">
-                <a16:creationId xmlns:a16="http://schemas.microsoft.com/office/drawing/2014/main" id="{E0AE6E76-753B-4075-AF5E-C2FCB74E3964}"/>
+                <a16:creationId xmlns:a16="http://schemas.microsoft.com/office/drawing/2014/main" id="{E48BDF96-31DF-4F62-BF1B-F24F99CAB6D2}"/>
               </a:ext>
             </a:extLst>
           </p:cNvPr>
@@ -5129,27 +5757,113 @@
         </p:nvSpPr>
         <p:spPr>
           <a:xfrm>
-            <a:off x="5666192" y="3212116"/>
-            <a:ext cx="2213452" cy="468062"/>
+            <a:off x="5943600" y="4251158"/>
+            <a:ext cx="1379621" cy="1732547"/>
           </a:xfrm>
-          <a:prstGeom prst="ellipse">
+          <a:custGeom>
             <a:avLst/>
-          </a:prstGeom>
+            <a:gdLst>
+              <a:gd name="connsiteX0" fmla="*/ 0 w 1315453"/>
+              <a:gd name="connsiteY0" fmla="*/ 31488 h 1756014"/>
+              <a:gd name="connsiteX1" fmla="*/ 810127 w 1315453"/>
+              <a:gd name="connsiteY1" fmla="*/ 232014 h 1756014"/>
+              <a:gd name="connsiteX2" fmla="*/ 1315453 w 1315453"/>
+              <a:gd name="connsiteY2" fmla="*/ 1756014 h 1756014"/>
+              <a:gd name="connsiteX0" fmla="*/ 0 w 1315453"/>
+              <a:gd name="connsiteY0" fmla="*/ 4013 h 1728539"/>
+              <a:gd name="connsiteX1" fmla="*/ 1034716 w 1315453"/>
+              <a:gd name="connsiteY1" fmla="*/ 565487 h 1728539"/>
+              <a:gd name="connsiteX2" fmla="*/ 1315453 w 1315453"/>
+              <a:gd name="connsiteY2" fmla="*/ 1728539 h 1728539"/>
+              <a:gd name="connsiteX0" fmla="*/ 0 w 1315453"/>
+              <a:gd name="connsiteY0" fmla="*/ 4194 h 1728720"/>
+              <a:gd name="connsiteX1" fmla="*/ 1034716 w 1315453"/>
+              <a:gd name="connsiteY1" fmla="*/ 565668 h 1728720"/>
+              <a:gd name="connsiteX2" fmla="*/ 1315453 w 1315453"/>
+              <a:gd name="connsiteY2" fmla="*/ 1728720 h 1728720"/>
+              <a:gd name="connsiteX0" fmla="*/ 0 w 1315453"/>
+              <a:gd name="connsiteY0" fmla="*/ 4013 h 1728539"/>
+              <a:gd name="connsiteX1" fmla="*/ 1034716 w 1315453"/>
+              <a:gd name="connsiteY1" fmla="*/ 565487 h 1728539"/>
+              <a:gd name="connsiteX2" fmla="*/ 1315453 w 1315453"/>
+              <a:gd name="connsiteY2" fmla="*/ 1728539 h 1728539"/>
+              <a:gd name="connsiteX0" fmla="*/ 0 w 1315453"/>
+              <a:gd name="connsiteY0" fmla="*/ 4013 h 1728539"/>
+              <a:gd name="connsiteX1" fmla="*/ 1034716 w 1315453"/>
+              <a:gd name="connsiteY1" fmla="*/ 565487 h 1728539"/>
+              <a:gd name="connsiteX2" fmla="*/ 1315453 w 1315453"/>
+              <a:gd name="connsiteY2" fmla="*/ 1728539 h 1728539"/>
+              <a:gd name="connsiteX0" fmla="*/ 0 w 1379621"/>
+              <a:gd name="connsiteY0" fmla="*/ 3938 h 1736485"/>
+              <a:gd name="connsiteX1" fmla="*/ 1098884 w 1379621"/>
+              <a:gd name="connsiteY1" fmla="*/ 573433 h 1736485"/>
+              <a:gd name="connsiteX2" fmla="*/ 1379621 w 1379621"/>
+              <a:gd name="connsiteY2" fmla="*/ 1736485 h 1736485"/>
+              <a:gd name="connsiteX0" fmla="*/ 0 w 1379621"/>
+              <a:gd name="connsiteY0" fmla="*/ 0 h 1732547"/>
+              <a:gd name="connsiteX1" fmla="*/ 1098884 w 1379621"/>
+              <a:gd name="connsiteY1" fmla="*/ 569495 h 1732547"/>
+              <a:gd name="connsiteX2" fmla="*/ 1379621 w 1379621"/>
+              <a:gd name="connsiteY2" fmla="*/ 1732547 h 1732547"/>
+              <a:gd name="connsiteX0" fmla="*/ 0 w 1379621"/>
+              <a:gd name="connsiteY0" fmla="*/ 0 h 1732547"/>
+              <a:gd name="connsiteX1" fmla="*/ 1379621 w 1379621"/>
+              <a:gd name="connsiteY1" fmla="*/ 1732547 h 1732547"/>
+              <a:gd name="connsiteX0" fmla="*/ 0 w 1379621"/>
+              <a:gd name="connsiteY0" fmla="*/ 0 h 1732547"/>
+              <a:gd name="connsiteX1" fmla="*/ 1379621 w 1379621"/>
+              <a:gd name="connsiteY1" fmla="*/ 1732547 h 1732547"/>
+              <a:gd name="connsiteX0" fmla="*/ 0 w 1379621"/>
+              <a:gd name="connsiteY0" fmla="*/ 0 h 1732547"/>
+              <a:gd name="connsiteX1" fmla="*/ 1379621 w 1379621"/>
+              <a:gd name="connsiteY1" fmla="*/ 1732547 h 1732547"/>
+            </a:gdLst>
+            <a:ahLst/>
+            <a:cxnLst>
+              <a:cxn ang="0">
+                <a:pos x="connsiteX0" y="connsiteY0"/>
+              </a:cxn>
+              <a:cxn ang="0">
+                <a:pos x="connsiteX1" y="connsiteY1"/>
+              </a:cxn>
+            </a:cxnLst>
+            <a:rect l="l" t="t" r="r" b="b"/>
+            <a:pathLst>
+              <a:path w="1379621" h="1732547">
+                <a:moveTo>
+                  <a:pt x="0" y="0"/>
+                </a:moveTo>
+                <a:cubicBezTo>
+                  <a:pt x="1213853" y="1"/>
+                  <a:pt x="1376947" y="1090863"/>
+                  <a:pt x="1379621" y="1732547"/>
+                </a:cubicBezTo>
+              </a:path>
+            </a:pathLst>
+          </a:custGeom>
           <a:noFill/>
-          <a:ln w="38100"/>
+          <a:ln w="38100">
+            <a:solidFill>
+              <a:srgbClr val="FF0000"/>
+            </a:solidFill>
+            <a:headEnd type="none" w="med" len="med"/>
+            <a:tailEnd type="triangle" w="med" len="med"/>
+          </a:ln>
         </p:spPr>
         <p:style>
           <a:lnRef idx="2">
-            <a:schemeClr val="accent2"/>
+            <a:schemeClr val="accent1">
+              <a:shade val="50000"/>
+            </a:schemeClr>
           </a:lnRef>
           <a:fillRef idx="1">
-            <a:schemeClr val="lt1"/>
+            <a:schemeClr val="accent1"/>
           </a:fillRef>
           <a:effectRef idx="0">
-            <a:schemeClr val="accent2"/>
+            <a:schemeClr val="accent1"/>
           </a:effectRef>
           <a:fontRef idx="minor">
-            <a:schemeClr val="dk1"/>
+            <a:schemeClr val="lt1"/>
           </a:fontRef>
         </p:style>
         <p:txBody>
@@ -5161,6 +5875,347 @@
           </a:p>
         </p:txBody>
       </p:sp>
+      <p:grpSp>
+        <p:nvGrpSpPr>
+          <p:cNvPr id="22" name="Group 21">
+            <a:extLst>
+              <a:ext uri="{FF2B5EF4-FFF2-40B4-BE49-F238E27FC236}">
+                <a16:creationId xmlns:a16="http://schemas.microsoft.com/office/drawing/2014/main" id="{19E3880C-8055-4F9E-9DB4-5791C8B28263}"/>
+              </a:ext>
+            </a:extLst>
+          </p:cNvPr>
+          <p:cNvGrpSpPr/>
+          <p:nvPr/>
+        </p:nvGrpSpPr>
+        <p:grpSpPr>
+          <a:xfrm>
+            <a:off x="1208340" y="3429001"/>
+            <a:ext cx="10064944" cy="3270920"/>
+            <a:chOff x="1208340" y="3429001"/>
+            <a:chExt cx="10064944" cy="3270920"/>
+          </a:xfrm>
+        </p:grpSpPr>
+        <p:pic>
+          <p:nvPicPr>
+            <p:cNvPr id="9" name="Picture 8">
+              <a:extLst>
+                <a:ext uri="{FF2B5EF4-FFF2-40B4-BE49-F238E27FC236}">
+                  <a16:creationId xmlns:a16="http://schemas.microsoft.com/office/drawing/2014/main" id="{5A6346AC-09EB-4B7A-B592-4DC029308A38}"/>
+                </a:ext>
+              </a:extLst>
+            </p:cNvPr>
+            <p:cNvPicPr>
+              <a:picLocks noChangeAspect="1"/>
+            </p:cNvPicPr>
+            <p:nvPr/>
+          </p:nvPicPr>
+          <p:blipFill>
+            <a:blip r:embed="rId2"/>
+            <a:stretch>
+              <a:fillRect/>
+            </a:stretch>
+          </p:blipFill>
+          <p:spPr>
+            <a:xfrm>
+              <a:off x="1208340" y="3429001"/>
+              <a:ext cx="10064944" cy="3270920"/>
+            </a:xfrm>
+            <a:prstGeom prst="rect">
+              <a:avLst/>
+            </a:prstGeom>
+          </p:spPr>
+        </p:pic>
+        <p:pic>
+          <p:nvPicPr>
+            <p:cNvPr id="14" name="Picture 13">
+              <a:extLst>
+                <a:ext uri="{FF2B5EF4-FFF2-40B4-BE49-F238E27FC236}">
+                  <a16:creationId xmlns:a16="http://schemas.microsoft.com/office/drawing/2014/main" id="{9C536DAD-2002-489F-B915-BBA9CC8CA661}"/>
+                </a:ext>
+              </a:extLst>
+            </p:cNvPr>
+            <p:cNvPicPr>
+              <a:picLocks noChangeAspect="1"/>
+            </p:cNvPicPr>
+            <p:nvPr/>
+          </p:nvPicPr>
+          <p:blipFill rotWithShape="1">
+            <a:blip r:embed="rId2"/>
+            <a:srcRect l="40844" t="23496" r="58702" b="72938"/>
+            <a:stretch/>
+          </p:blipFill>
+          <p:spPr>
+            <a:xfrm>
+              <a:off x="5781249" y="4198145"/>
+              <a:ext cx="45719" cy="116681"/>
+            </a:xfrm>
+            <a:custGeom>
+              <a:avLst/>
+              <a:gdLst>
+                <a:gd name="connsiteX0" fmla="*/ 0 w 45719"/>
+                <a:gd name="connsiteY0" fmla="*/ 0 h 76200"/>
+                <a:gd name="connsiteX1" fmla="*/ 45719 w 45719"/>
+                <a:gd name="connsiteY1" fmla="*/ 0 h 76200"/>
+                <a:gd name="connsiteX2" fmla="*/ 45719 w 45719"/>
+                <a:gd name="connsiteY2" fmla="*/ 76200 h 76200"/>
+                <a:gd name="connsiteX3" fmla="*/ 0 w 45719"/>
+                <a:gd name="connsiteY3" fmla="*/ 76200 h 76200"/>
+              </a:gdLst>
+              <a:ahLst/>
+              <a:cxnLst>
+                <a:cxn ang="0">
+                  <a:pos x="connsiteX0" y="connsiteY0"/>
+                </a:cxn>
+                <a:cxn ang="0">
+                  <a:pos x="connsiteX1" y="connsiteY1"/>
+                </a:cxn>
+                <a:cxn ang="0">
+                  <a:pos x="connsiteX2" y="connsiteY2"/>
+                </a:cxn>
+                <a:cxn ang="0">
+                  <a:pos x="connsiteX3" y="connsiteY3"/>
+                </a:cxn>
+              </a:cxnLst>
+              <a:rect l="l" t="t" r="r" b="b"/>
+              <a:pathLst>
+                <a:path w="45719" h="76200">
+                  <a:moveTo>
+                    <a:pt x="0" y="0"/>
+                  </a:moveTo>
+                  <a:lnTo>
+                    <a:pt x="45719" y="0"/>
+                  </a:lnTo>
+                  <a:lnTo>
+                    <a:pt x="45719" y="76200"/>
+                  </a:lnTo>
+                  <a:lnTo>
+                    <a:pt x="0" y="76200"/>
+                  </a:lnTo>
+                  <a:close/>
+                </a:path>
+              </a:pathLst>
+            </a:custGeom>
+          </p:spPr>
+        </p:pic>
+        <p:pic>
+          <p:nvPicPr>
+            <p:cNvPr id="17" name="Picture 16">
+              <a:extLst>
+                <a:ext uri="{FF2B5EF4-FFF2-40B4-BE49-F238E27FC236}">
+                  <a16:creationId xmlns:a16="http://schemas.microsoft.com/office/drawing/2014/main" id="{BB2F6B38-03A0-4AD8-9A2D-8A118510BDF0}"/>
+                </a:ext>
+              </a:extLst>
+            </p:cNvPr>
+            <p:cNvPicPr>
+              <a:picLocks noChangeAspect="1"/>
+            </p:cNvPicPr>
+            <p:nvPr/>
+          </p:nvPicPr>
+          <p:blipFill>
+            <a:blip r:embed="rId2"/>
+            <a:srcRect l="84381" t="82629" r="14886" b="14095"/>
+            <a:stretch>
+              <a:fillRect/>
+            </a:stretch>
+          </p:blipFill>
+          <p:spPr>
+            <a:xfrm>
+              <a:off x="10446546" y="6137218"/>
+              <a:ext cx="73818" cy="107156"/>
+            </a:xfrm>
+            <a:custGeom>
+              <a:avLst/>
+              <a:gdLst>
+                <a:gd name="connsiteX0" fmla="*/ 0 w 73818"/>
+                <a:gd name="connsiteY0" fmla="*/ 0 h 107156"/>
+                <a:gd name="connsiteX1" fmla="*/ 73818 w 73818"/>
+                <a:gd name="connsiteY1" fmla="*/ 0 h 107156"/>
+                <a:gd name="connsiteX2" fmla="*/ 73818 w 73818"/>
+                <a:gd name="connsiteY2" fmla="*/ 107156 h 107156"/>
+                <a:gd name="connsiteX3" fmla="*/ 0 w 73818"/>
+                <a:gd name="connsiteY3" fmla="*/ 107156 h 107156"/>
+              </a:gdLst>
+              <a:ahLst/>
+              <a:cxnLst>
+                <a:cxn ang="0">
+                  <a:pos x="connsiteX0" y="connsiteY0"/>
+                </a:cxn>
+                <a:cxn ang="0">
+                  <a:pos x="connsiteX1" y="connsiteY1"/>
+                </a:cxn>
+                <a:cxn ang="0">
+                  <a:pos x="connsiteX2" y="connsiteY2"/>
+                </a:cxn>
+                <a:cxn ang="0">
+                  <a:pos x="connsiteX3" y="connsiteY3"/>
+                </a:cxn>
+              </a:cxnLst>
+              <a:rect l="l" t="t" r="r" b="b"/>
+              <a:pathLst>
+                <a:path w="73818" h="107156">
+                  <a:moveTo>
+                    <a:pt x="0" y="0"/>
+                  </a:moveTo>
+                  <a:lnTo>
+                    <a:pt x="73818" y="0"/>
+                  </a:lnTo>
+                  <a:lnTo>
+                    <a:pt x="73818" y="107156"/>
+                  </a:lnTo>
+                  <a:lnTo>
+                    <a:pt x="0" y="107156"/>
+                  </a:lnTo>
+                  <a:close/>
+                </a:path>
+              </a:pathLst>
+            </a:custGeom>
+          </p:spPr>
+        </p:pic>
+        <p:pic>
+          <p:nvPicPr>
+            <p:cNvPr id="20" name="Picture 19">
+              <a:extLst>
+                <a:ext uri="{FF2B5EF4-FFF2-40B4-BE49-F238E27FC236}">
+                  <a16:creationId xmlns:a16="http://schemas.microsoft.com/office/drawing/2014/main" id="{D0E24821-A746-46FC-9869-0C13FB7DF4F9}"/>
+                </a:ext>
+              </a:extLst>
+            </p:cNvPr>
+            <p:cNvPicPr>
+              <a:picLocks noChangeAspect="1"/>
+            </p:cNvPicPr>
+            <p:nvPr/>
+          </p:nvPicPr>
+          <p:blipFill rotWithShape="1">
+            <a:blip r:embed="rId2"/>
+            <a:srcRect l="27003" t="75347" r="72495" b="20574"/>
+            <a:stretch/>
+          </p:blipFill>
+          <p:spPr>
+            <a:xfrm>
+              <a:off x="3945257" y="5672138"/>
+              <a:ext cx="50481" cy="133350"/>
+            </a:xfrm>
+            <a:custGeom>
+              <a:avLst/>
+              <a:gdLst>
+                <a:gd name="connsiteX0" fmla="*/ 0 w 45719"/>
+                <a:gd name="connsiteY0" fmla="*/ 0 h 72174"/>
+                <a:gd name="connsiteX1" fmla="*/ 45719 w 45719"/>
+                <a:gd name="connsiteY1" fmla="*/ 0 h 72174"/>
+                <a:gd name="connsiteX2" fmla="*/ 45719 w 45719"/>
+                <a:gd name="connsiteY2" fmla="*/ 72174 h 72174"/>
+                <a:gd name="connsiteX3" fmla="*/ 0 w 45719"/>
+                <a:gd name="connsiteY3" fmla="*/ 72174 h 72174"/>
+              </a:gdLst>
+              <a:ahLst/>
+              <a:cxnLst>
+                <a:cxn ang="0">
+                  <a:pos x="connsiteX0" y="connsiteY0"/>
+                </a:cxn>
+                <a:cxn ang="0">
+                  <a:pos x="connsiteX1" y="connsiteY1"/>
+                </a:cxn>
+                <a:cxn ang="0">
+                  <a:pos x="connsiteX2" y="connsiteY2"/>
+                </a:cxn>
+                <a:cxn ang="0">
+                  <a:pos x="connsiteX3" y="connsiteY3"/>
+                </a:cxn>
+              </a:cxnLst>
+              <a:rect l="l" t="t" r="r" b="b"/>
+              <a:pathLst>
+                <a:path w="45719" h="72174">
+                  <a:moveTo>
+                    <a:pt x="0" y="0"/>
+                  </a:moveTo>
+                  <a:lnTo>
+                    <a:pt x="45719" y="0"/>
+                  </a:lnTo>
+                  <a:lnTo>
+                    <a:pt x="45719" y="72174"/>
+                  </a:lnTo>
+                  <a:lnTo>
+                    <a:pt x="0" y="72174"/>
+                  </a:lnTo>
+                  <a:close/>
+                </a:path>
+              </a:pathLst>
+            </a:custGeom>
+          </p:spPr>
+        </p:pic>
+        <p:pic>
+          <p:nvPicPr>
+            <p:cNvPr id="21" name="Picture 20">
+              <a:extLst>
+                <a:ext uri="{FF2B5EF4-FFF2-40B4-BE49-F238E27FC236}">
+                  <a16:creationId xmlns:a16="http://schemas.microsoft.com/office/drawing/2014/main" id="{3923127E-6785-45E0-8105-166BC82BED7D}"/>
+                </a:ext>
+              </a:extLst>
+            </p:cNvPr>
+            <p:cNvPicPr>
+              <a:picLocks noChangeAspect="1"/>
+            </p:cNvPicPr>
+            <p:nvPr/>
+          </p:nvPicPr>
+          <p:blipFill rotWithShape="1">
+            <a:blip r:embed="rId2"/>
+            <a:srcRect l="27003" t="75347" r="72495" b="20574"/>
+            <a:stretch/>
+          </p:blipFill>
+          <p:spPr>
+            <a:xfrm>
+              <a:off x="1578294" y="3500438"/>
+              <a:ext cx="50481" cy="133350"/>
+            </a:xfrm>
+            <a:custGeom>
+              <a:avLst/>
+              <a:gdLst>
+                <a:gd name="connsiteX0" fmla="*/ 0 w 45719"/>
+                <a:gd name="connsiteY0" fmla="*/ 0 h 72174"/>
+                <a:gd name="connsiteX1" fmla="*/ 45719 w 45719"/>
+                <a:gd name="connsiteY1" fmla="*/ 0 h 72174"/>
+                <a:gd name="connsiteX2" fmla="*/ 45719 w 45719"/>
+                <a:gd name="connsiteY2" fmla="*/ 72174 h 72174"/>
+                <a:gd name="connsiteX3" fmla="*/ 0 w 45719"/>
+                <a:gd name="connsiteY3" fmla="*/ 72174 h 72174"/>
+              </a:gdLst>
+              <a:ahLst/>
+              <a:cxnLst>
+                <a:cxn ang="0">
+                  <a:pos x="connsiteX0" y="connsiteY0"/>
+                </a:cxn>
+                <a:cxn ang="0">
+                  <a:pos x="connsiteX1" y="connsiteY1"/>
+                </a:cxn>
+                <a:cxn ang="0">
+                  <a:pos x="connsiteX2" y="connsiteY2"/>
+                </a:cxn>
+                <a:cxn ang="0">
+                  <a:pos x="connsiteX3" y="connsiteY3"/>
+                </a:cxn>
+              </a:cxnLst>
+              <a:rect l="l" t="t" r="r" b="b"/>
+              <a:pathLst>
+                <a:path w="45719" h="72174">
+                  <a:moveTo>
+                    <a:pt x="0" y="0"/>
+                  </a:moveTo>
+                  <a:lnTo>
+                    <a:pt x="45719" y="0"/>
+                  </a:lnTo>
+                  <a:lnTo>
+                    <a:pt x="45719" y="72174"/>
+                  </a:lnTo>
+                  <a:lnTo>
+                    <a:pt x="0" y="72174"/>
+                  </a:lnTo>
+                  <a:close/>
+                </a:path>
+              </a:pathLst>
+            </a:custGeom>
+          </p:spPr>
+        </p:pic>
+      </p:grpSp>
     </p:spTree>
     <p:extLst>
       <p:ext uri="{BB962C8B-B14F-4D97-AF65-F5344CB8AC3E}">
@@ -5175,6 +6230,144 @@
 </file>
 
 <file path=ppt/slides/slide3.xml><?xml version="1.0" encoding="utf-8"?>
+<p:sld xmlns:a="http://schemas.openxmlformats.org/drawingml/2006/main" xmlns:r="http://schemas.openxmlformats.org/officeDocument/2006/relationships" xmlns:p="http://schemas.openxmlformats.org/presentationml/2006/main">
+  <p:cSld>
+    <p:spTree>
+      <p:nvGrpSpPr>
+        <p:cNvPr id="1" name=""/>
+        <p:cNvGrpSpPr/>
+        <p:nvPr/>
+      </p:nvGrpSpPr>
+      <p:grpSpPr>
+        <a:xfrm>
+          <a:off x="0" y="0"/>
+          <a:ext cx="0" cy="0"/>
+          <a:chOff x="0" y="0"/>
+          <a:chExt cx="0" cy="0"/>
+        </a:xfrm>
+      </p:grpSpPr>
+      <p:sp>
+        <p:nvSpPr>
+          <p:cNvPr id="2" name="Content Placeholder 1">
+            <a:extLst>
+              <a:ext uri="{FF2B5EF4-FFF2-40B4-BE49-F238E27FC236}">
+                <a16:creationId xmlns:a16="http://schemas.microsoft.com/office/drawing/2014/main" id="{5A592B84-F81F-4694-A26A-E3215D232023}"/>
+              </a:ext>
+            </a:extLst>
+          </p:cNvPr>
+          <p:cNvSpPr>
+            <a:spLocks noGrp="1"/>
+          </p:cNvSpPr>
+          <p:nvPr>
+            <p:ph idx="1"/>
+          </p:nvPr>
+        </p:nvSpPr>
+        <p:spPr>
+          <a:xfrm>
+            <a:off x="623948" y="1431144"/>
+            <a:ext cx="4628152" cy="4726088"/>
+          </a:xfrm>
+        </p:spPr>
+        <p:txBody>
+          <a:bodyPr/>
+          <a:lstStyle/>
+          <a:p>
+            <a:pPr marL="514350" indent="-514350">
+              <a:buFont typeface="Quicksand" panose="02070303000000060000" pitchFamily="18" charset="0"/>
+              <a:buAutoNum type="arabicPeriod"/>
+            </a:pPr>
+            <a:r>
+              <a:rPr lang="en-CA" dirty="0"/>
+              <a:t>Open R and set the working directory to the “Day2” folder</a:t>
+            </a:r>
+          </a:p>
+          <a:p>
+            <a:pPr marL="514350" indent="-514350">
+              <a:buAutoNum type="arabicPeriod"/>
+            </a:pPr>
+            <a:endParaRPr lang="en-CA" dirty="0"/>
+          </a:p>
+          <a:p>
+            <a:pPr marL="514350" indent="-514350">
+              <a:buAutoNum type="arabicPeriod"/>
+            </a:pPr>
+            <a:endParaRPr lang="en-US" dirty="0"/>
+          </a:p>
+        </p:txBody>
+      </p:sp>
+      <p:sp>
+        <p:nvSpPr>
+          <p:cNvPr id="3" name="Slide Number Placeholder 2">
+            <a:extLst>
+              <a:ext uri="{FF2B5EF4-FFF2-40B4-BE49-F238E27FC236}">
+                <a16:creationId xmlns:a16="http://schemas.microsoft.com/office/drawing/2014/main" id="{E86981B5-CB08-49DF-8D72-6AB5B34C700A}"/>
+              </a:ext>
+            </a:extLst>
+          </p:cNvPr>
+          <p:cNvSpPr>
+            <a:spLocks noGrp="1"/>
+          </p:cNvSpPr>
+          <p:nvPr>
+            <p:ph type="sldNum" sz="quarter" idx="12"/>
+          </p:nvPr>
+        </p:nvSpPr>
+        <p:spPr/>
+        <p:txBody>
+          <a:bodyPr/>
+          <a:lstStyle/>
+          <a:p>
+            <a:fld id="{E50A8D5F-7A10-4D19-B2BD-04FE5CA3B31F}" type="slidenum">
+              <a:rPr lang="en-US" smtClean="0"/>
+              <a:pPr/>
+              <a:t>3</a:t>
+            </a:fld>
+            <a:endParaRPr lang="en-US" dirty="0"/>
+          </a:p>
+        </p:txBody>
+      </p:sp>
+      <p:sp>
+        <p:nvSpPr>
+          <p:cNvPr id="4" name="Title 3">
+            <a:extLst>
+              <a:ext uri="{FF2B5EF4-FFF2-40B4-BE49-F238E27FC236}">
+                <a16:creationId xmlns:a16="http://schemas.microsoft.com/office/drawing/2014/main" id="{1315864D-DFFC-436D-84CD-3FE4AE1832A5}"/>
+              </a:ext>
+            </a:extLst>
+          </p:cNvPr>
+          <p:cNvSpPr>
+            <a:spLocks noGrp="1"/>
+          </p:cNvSpPr>
+          <p:nvPr>
+            <p:ph type="title"/>
+          </p:nvPr>
+        </p:nvSpPr>
+        <p:spPr/>
+        <p:txBody>
+          <a:bodyPr/>
+          <a:lstStyle/>
+          <a:p>
+            <a:r>
+              <a:rPr lang="en-CA" dirty="0"/>
+              <a:t>Tutorial setup</a:t>
+            </a:r>
+            <a:endParaRPr lang="en-US" dirty="0"/>
+          </a:p>
+        </p:txBody>
+      </p:sp>
+    </p:spTree>
+    <p:extLst>
+      <p:ext uri="{BB962C8B-B14F-4D97-AF65-F5344CB8AC3E}">
+        <p14:creationId xmlns:p14="http://schemas.microsoft.com/office/powerpoint/2010/main" val="775959748"/>
+      </p:ext>
+    </p:extLst>
+  </p:cSld>
+  <p:clrMapOvr>
+    <a:masterClrMapping/>
+  </p:clrMapOvr>
+</p:sld>
+</file>
+
+<file path=ppt/slides/slide4.xml><?xml version="1.0" encoding="utf-8"?>
 <p:sld xmlns:a="http://schemas.openxmlformats.org/drawingml/2006/main" xmlns:r="http://schemas.openxmlformats.org/officeDocument/2006/relationships" xmlns:p="http://schemas.openxmlformats.org/presentationml/2006/main">
   <p:cSld>
     <p:spTree>
@@ -5299,7 +6492,7 @@
             <a:fld id="{E50A8D5F-7A10-4D19-B2BD-04FE5CA3B31F}" type="slidenum">
               <a:rPr lang="en-US" smtClean="0"/>
               <a:pPr/>
-              <a:t>3</a:t>
+              <a:t>4</a:t>
             </a:fld>
             <a:endParaRPr lang="en-US" dirty="0"/>
           </a:p>
@@ -5668,579 +6861,6 @@
                                           <p:spTgt spid="2">
                                             <p:txEl>
                                               <p:pRg st="5" end="5"/>
-                                            </p:txEl>
-                                          </p:spTgt>
-                                        </p:tgtEl>
-                                      </p:cBhvr>
-                                    </p:animEffect>
-                                  </p:childTnLst>
-                                </p:cTn>
-                              </p:par>
-                            </p:childTnLst>
-                          </p:cTn>
-                        </p:par>
-                      </p:childTnLst>
-                    </p:cTn>
-                  </p:par>
-                </p:childTnLst>
-              </p:cTn>
-              <p:prevCondLst>
-                <p:cond evt="onPrev" delay="0">
-                  <p:tgtEl>
-                    <p:sldTgt/>
-                  </p:tgtEl>
-                </p:cond>
-              </p:prevCondLst>
-              <p:nextCondLst>
-                <p:cond evt="onNext" delay="0">
-                  <p:tgtEl>
-                    <p:sldTgt/>
-                  </p:tgtEl>
-                </p:cond>
-              </p:nextCondLst>
-            </p:seq>
-          </p:childTnLst>
-        </p:cTn>
-      </p:par>
-    </p:tnLst>
-    <p:bldLst>
-      <p:bldP spid="2" grpId="0" build="p"/>
-    </p:bldLst>
-  </p:timing>
-</p:sld>
-</file>
-
-<file path=ppt/slides/slide4.xml><?xml version="1.0" encoding="utf-8"?>
-<p:sld xmlns:a="http://schemas.openxmlformats.org/drawingml/2006/main" xmlns:r="http://schemas.openxmlformats.org/officeDocument/2006/relationships" xmlns:p="http://schemas.openxmlformats.org/presentationml/2006/main">
-  <p:cSld>
-    <p:spTree>
-      <p:nvGrpSpPr>
-        <p:cNvPr id="1" name=""/>
-        <p:cNvGrpSpPr/>
-        <p:nvPr/>
-      </p:nvGrpSpPr>
-      <p:grpSpPr>
-        <a:xfrm>
-          <a:off x="0" y="0"/>
-          <a:ext cx="0" cy="0"/>
-          <a:chOff x="0" y="0"/>
-          <a:chExt cx="0" cy="0"/>
-        </a:xfrm>
-      </p:grpSpPr>
-      <p:sp>
-        <p:nvSpPr>
-          <p:cNvPr id="2" name="Content Placeholder 1">
-            <a:extLst>
-              <a:ext uri="{FF2B5EF4-FFF2-40B4-BE49-F238E27FC236}">
-                <a16:creationId xmlns:a16="http://schemas.microsoft.com/office/drawing/2014/main" id="{CA51C058-7710-450C-B21E-7660FCDE81A7}"/>
-              </a:ext>
-            </a:extLst>
-          </p:cNvPr>
-          <p:cNvSpPr>
-            <a:spLocks noGrp="1"/>
-          </p:cNvSpPr>
-          <p:nvPr>
-            <p:ph idx="1"/>
-          </p:nvPr>
-        </p:nvSpPr>
-        <p:spPr/>
-        <p:txBody>
-          <a:bodyPr/>
-          <a:lstStyle/>
-          <a:p>
-            <a:r>
-              <a:rPr lang="en-CA" dirty="0"/>
-              <a:t>Three Narwhals tagged in Tremblay Sound</a:t>
-            </a:r>
-          </a:p>
-          <a:p>
-            <a:r>
-              <a:rPr lang="en-CA" dirty="0" err="1"/>
-              <a:t>Fastloc</a:t>
-            </a:r>
-            <a:r>
-              <a:rPr lang="en-CA" dirty="0"/>
-              <a:t> GPS and ARGOS location data</a:t>
-            </a:r>
-          </a:p>
-          <a:p>
-            <a:r>
-              <a:rPr lang="en-CA" dirty="0"/>
-              <a:t>Mean depth data</a:t>
-            </a:r>
-          </a:p>
-          <a:p>
-            <a:r>
-              <a:rPr lang="en-CA" dirty="0"/>
-              <a:t>Temporal resolution:</a:t>
-            </a:r>
-          </a:p>
-          <a:p>
-            <a:pPr lvl="1"/>
-            <a:r>
-              <a:rPr lang="en-CA" dirty="0" err="1"/>
-              <a:t>Fastloc</a:t>
-            </a:r>
-            <a:r>
-              <a:rPr lang="en-CA" dirty="0"/>
-              <a:t> GPS: 10 min</a:t>
-            </a:r>
-          </a:p>
-          <a:p>
-            <a:pPr lvl="1"/>
-            <a:r>
-              <a:rPr lang="en-CA" dirty="0"/>
-              <a:t>ARGOS: irregular</a:t>
-            </a:r>
-          </a:p>
-          <a:p>
-            <a:pPr lvl="1"/>
-            <a:r>
-              <a:rPr lang="en-CA" dirty="0"/>
-              <a:t>Depth data: 75 s</a:t>
-            </a:r>
-          </a:p>
-          <a:p>
-            <a:endParaRPr lang="en-US" dirty="0"/>
-          </a:p>
-        </p:txBody>
-      </p:sp>
-      <p:sp>
-        <p:nvSpPr>
-          <p:cNvPr id="3" name="Slide Number Placeholder 2">
-            <a:extLst>
-              <a:ext uri="{FF2B5EF4-FFF2-40B4-BE49-F238E27FC236}">
-                <a16:creationId xmlns:a16="http://schemas.microsoft.com/office/drawing/2014/main" id="{E0469174-1D07-447E-8E7F-A6C30711A0CA}"/>
-              </a:ext>
-            </a:extLst>
-          </p:cNvPr>
-          <p:cNvSpPr>
-            <a:spLocks noGrp="1"/>
-          </p:cNvSpPr>
-          <p:nvPr>
-            <p:ph type="sldNum" sz="quarter" idx="12"/>
-          </p:nvPr>
-        </p:nvSpPr>
-        <p:spPr/>
-        <p:txBody>
-          <a:bodyPr/>
-          <a:lstStyle/>
-          <a:p>
-            <a:fld id="{E50A8D5F-7A10-4D19-B2BD-04FE5CA3B31F}" type="slidenum">
-              <a:rPr lang="en-US" smtClean="0"/>
-              <a:pPr/>
-              <a:t>4</a:t>
-            </a:fld>
-            <a:endParaRPr lang="en-US" dirty="0"/>
-          </a:p>
-        </p:txBody>
-      </p:sp>
-      <p:sp>
-        <p:nvSpPr>
-          <p:cNvPr id="4" name="Title 3">
-            <a:extLst>
-              <a:ext uri="{FF2B5EF4-FFF2-40B4-BE49-F238E27FC236}">
-                <a16:creationId xmlns:a16="http://schemas.microsoft.com/office/drawing/2014/main" id="{8D39DE9B-B802-4CC3-AB9F-93A9C3664E9F}"/>
-              </a:ext>
-            </a:extLst>
-          </p:cNvPr>
-          <p:cNvSpPr>
-            <a:spLocks noGrp="1"/>
-          </p:cNvSpPr>
-          <p:nvPr>
-            <p:ph type="title"/>
-          </p:nvPr>
-        </p:nvSpPr>
-        <p:spPr/>
-        <p:txBody>
-          <a:bodyPr/>
-          <a:lstStyle/>
-          <a:p>
-            <a:r>
-              <a:rPr lang="en-CA" dirty="0"/>
-              <a:t>Data</a:t>
-            </a:r>
-            <a:endParaRPr lang="en-US" dirty="0"/>
-          </a:p>
-        </p:txBody>
-      </p:sp>
-    </p:spTree>
-    <p:extLst>
-      <p:ext uri="{BB962C8B-B14F-4D97-AF65-F5344CB8AC3E}">
-        <p14:creationId xmlns:p14="http://schemas.microsoft.com/office/powerpoint/2010/main" val="809460727"/>
-      </p:ext>
-    </p:extLst>
-  </p:cSld>
-  <p:clrMapOvr>
-    <a:masterClrMapping/>
-  </p:clrMapOvr>
-  <p:timing>
-    <p:tnLst>
-      <p:par>
-        <p:cTn id="1" dur="indefinite" restart="never" nodeType="tmRoot">
-          <p:childTnLst>
-            <p:seq concurrent="1" nextAc="seek">
-              <p:cTn id="2" dur="indefinite" nodeType="mainSeq">
-                <p:childTnLst>
-                  <p:par>
-                    <p:cTn id="3" fill="hold">
-                      <p:stCondLst>
-                        <p:cond delay="indefinite"/>
-                      </p:stCondLst>
-                      <p:childTnLst>
-                        <p:par>
-                          <p:cTn id="4" fill="hold">
-                            <p:stCondLst>
-                              <p:cond delay="0"/>
-                            </p:stCondLst>
-                            <p:childTnLst>
-                              <p:par>
-                                <p:cTn id="5" presetID="10" presetClass="entr" presetSubtype="0" fill="hold" grpId="0" nodeType="clickEffect">
-                                  <p:stCondLst>
-                                    <p:cond delay="0"/>
-                                  </p:stCondLst>
-                                  <p:childTnLst>
-                                    <p:set>
-                                      <p:cBhvr>
-                                        <p:cTn id="6" dur="1" fill="hold">
-                                          <p:stCondLst>
-                                            <p:cond delay="0"/>
-                                          </p:stCondLst>
-                                        </p:cTn>
-                                        <p:tgtEl>
-                                          <p:spTgt spid="2">
-                                            <p:txEl>
-                                              <p:pRg st="0" end="0"/>
-                                            </p:txEl>
-                                          </p:spTgt>
-                                        </p:tgtEl>
-                                        <p:attrNameLst>
-                                          <p:attrName>style.visibility</p:attrName>
-                                        </p:attrNameLst>
-                                      </p:cBhvr>
-                                      <p:to>
-                                        <p:strVal val="visible"/>
-                                      </p:to>
-                                    </p:set>
-                                    <p:animEffect transition="in" filter="fade">
-                                      <p:cBhvr>
-                                        <p:cTn id="7" dur="500"/>
-                                        <p:tgtEl>
-                                          <p:spTgt spid="2">
-                                            <p:txEl>
-                                              <p:pRg st="0" end="0"/>
-                                            </p:txEl>
-                                          </p:spTgt>
-                                        </p:tgtEl>
-                                      </p:cBhvr>
-                                    </p:animEffect>
-                                  </p:childTnLst>
-                                </p:cTn>
-                              </p:par>
-                            </p:childTnLst>
-                          </p:cTn>
-                        </p:par>
-                      </p:childTnLst>
-                    </p:cTn>
-                  </p:par>
-                  <p:par>
-                    <p:cTn id="8" fill="hold">
-                      <p:stCondLst>
-                        <p:cond delay="indefinite"/>
-                      </p:stCondLst>
-                      <p:childTnLst>
-                        <p:par>
-                          <p:cTn id="9" fill="hold">
-                            <p:stCondLst>
-                              <p:cond delay="0"/>
-                            </p:stCondLst>
-                            <p:childTnLst>
-                              <p:par>
-                                <p:cTn id="10" presetID="10" presetClass="entr" presetSubtype="0" fill="hold" grpId="0" nodeType="clickEffect">
-                                  <p:stCondLst>
-                                    <p:cond delay="0"/>
-                                  </p:stCondLst>
-                                  <p:childTnLst>
-                                    <p:set>
-                                      <p:cBhvr>
-                                        <p:cTn id="11" dur="1" fill="hold">
-                                          <p:stCondLst>
-                                            <p:cond delay="0"/>
-                                          </p:stCondLst>
-                                        </p:cTn>
-                                        <p:tgtEl>
-                                          <p:spTgt spid="2">
-                                            <p:txEl>
-                                              <p:pRg st="1" end="1"/>
-                                            </p:txEl>
-                                          </p:spTgt>
-                                        </p:tgtEl>
-                                        <p:attrNameLst>
-                                          <p:attrName>style.visibility</p:attrName>
-                                        </p:attrNameLst>
-                                      </p:cBhvr>
-                                      <p:to>
-                                        <p:strVal val="visible"/>
-                                      </p:to>
-                                    </p:set>
-                                    <p:animEffect transition="in" filter="fade">
-                                      <p:cBhvr>
-                                        <p:cTn id="12" dur="500"/>
-                                        <p:tgtEl>
-                                          <p:spTgt spid="2">
-                                            <p:txEl>
-                                              <p:pRg st="1" end="1"/>
-                                            </p:txEl>
-                                          </p:spTgt>
-                                        </p:tgtEl>
-                                      </p:cBhvr>
-                                    </p:animEffect>
-                                  </p:childTnLst>
-                                </p:cTn>
-                              </p:par>
-                            </p:childTnLst>
-                          </p:cTn>
-                        </p:par>
-                      </p:childTnLst>
-                    </p:cTn>
-                  </p:par>
-                  <p:par>
-                    <p:cTn id="13" fill="hold">
-                      <p:stCondLst>
-                        <p:cond delay="indefinite"/>
-                      </p:stCondLst>
-                      <p:childTnLst>
-                        <p:par>
-                          <p:cTn id="14" fill="hold">
-                            <p:stCondLst>
-                              <p:cond delay="0"/>
-                            </p:stCondLst>
-                            <p:childTnLst>
-                              <p:par>
-                                <p:cTn id="15" presetID="10" presetClass="entr" presetSubtype="0" fill="hold" grpId="0" nodeType="clickEffect">
-                                  <p:stCondLst>
-                                    <p:cond delay="0"/>
-                                  </p:stCondLst>
-                                  <p:childTnLst>
-                                    <p:set>
-                                      <p:cBhvr>
-                                        <p:cTn id="16" dur="1" fill="hold">
-                                          <p:stCondLst>
-                                            <p:cond delay="0"/>
-                                          </p:stCondLst>
-                                        </p:cTn>
-                                        <p:tgtEl>
-                                          <p:spTgt spid="2">
-                                            <p:txEl>
-                                              <p:pRg st="2" end="2"/>
-                                            </p:txEl>
-                                          </p:spTgt>
-                                        </p:tgtEl>
-                                        <p:attrNameLst>
-                                          <p:attrName>style.visibility</p:attrName>
-                                        </p:attrNameLst>
-                                      </p:cBhvr>
-                                      <p:to>
-                                        <p:strVal val="visible"/>
-                                      </p:to>
-                                    </p:set>
-                                    <p:animEffect transition="in" filter="fade">
-                                      <p:cBhvr>
-                                        <p:cTn id="17" dur="500"/>
-                                        <p:tgtEl>
-                                          <p:spTgt spid="2">
-                                            <p:txEl>
-                                              <p:pRg st="2" end="2"/>
-                                            </p:txEl>
-                                          </p:spTgt>
-                                        </p:tgtEl>
-                                      </p:cBhvr>
-                                    </p:animEffect>
-                                  </p:childTnLst>
-                                </p:cTn>
-                              </p:par>
-                            </p:childTnLst>
-                          </p:cTn>
-                        </p:par>
-                      </p:childTnLst>
-                    </p:cTn>
-                  </p:par>
-                  <p:par>
-                    <p:cTn id="18" fill="hold">
-                      <p:stCondLst>
-                        <p:cond delay="indefinite"/>
-                      </p:stCondLst>
-                      <p:childTnLst>
-                        <p:par>
-                          <p:cTn id="19" fill="hold">
-                            <p:stCondLst>
-                              <p:cond delay="0"/>
-                            </p:stCondLst>
-                            <p:childTnLst>
-                              <p:par>
-                                <p:cTn id="20" presetID="10" presetClass="entr" presetSubtype="0" fill="hold" grpId="0" nodeType="clickEffect">
-                                  <p:stCondLst>
-                                    <p:cond delay="0"/>
-                                  </p:stCondLst>
-                                  <p:childTnLst>
-                                    <p:set>
-                                      <p:cBhvr>
-                                        <p:cTn id="21" dur="1" fill="hold">
-                                          <p:stCondLst>
-                                            <p:cond delay="0"/>
-                                          </p:stCondLst>
-                                        </p:cTn>
-                                        <p:tgtEl>
-                                          <p:spTgt spid="2">
-                                            <p:txEl>
-                                              <p:pRg st="3" end="3"/>
-                                            </p:txEl>
-                                          </p:spTgt>
-                                        </p:tgtEl>
-                                        <p:attrNameLst>
-                                          <p:attrName>style.visibility</p:attrName>
-                                        </p:attrNameLst>
-                                      </p:cBhvr>
-                                      <p:to>
-                                        <p:strVal val="visible"/>
-                                      </p:to>
-                                    </p:set>
-                                    <p:animEffect transition="in" filter="fade">
-                                      <p:cBhvr>
-                                        <p:cTn id="22" dur="500"/>
-                                        <p:tgtEl>
-                                          <p:spTgt spid="2">
-                                            <p:txEl>
-                                              <p:pRg st="3" end="3"/>
-                                            </p:txEl>
-                                          </p:spTgt>
-                                        </p:tgtEl>
-                                      </p:cBhvr>
-                                    </p:animEffect>
-                                  </p:childTnLst>
-                                </p:cTn>
-                              </p:par>
-                              <p:par>
-                                <p:cTn id="23" presetID="10" presetClass="entr" presetSubtype="0" fill="hold" grpId="0" nodeType="withEffect">
-                                  <p:stCondLst>
-                                    <p:cond delay="0"/>
-                                  </p:stCondLst>
-                                  <p:childTnLst>
-                                    <p:set>
-                                      <p:cBhvr>
-                                        <p:cTn id="24" dur="1" fill="hold">
-                                          <p:stCondLst>
-                                            <p:cond delay="0"/>
-                                          </p:stCondLst>
-                                        </p:cTn>
-                                        <p:tgtEl>
-                                          <p:spTgt spid="2">
-                                            <p:txEl>
-                                              <p:pRg st="4" end="4"/>
-                                            </p:txEl>
-                                          </p:spTgt>
-                                        </p:tgtEl>
-                                        <p:attrNameLst>
-                                          <p:attrName>style.visibility</p:attrName>
-                                        </p:attrNameLst>
-                                      </p:cBhvr>
-                                      <p:to>
-                                        <p:strVal val="visible"/>
-                                      </p:to>
-                                    </p:set>
-                                    <p:animEffect transition="in" filter="fade">
-                                      <p:cBhvr>
-                                        <p:cTn id="25" dur="500"/>
-                                        <p:tgtEl>
-                                          <p:spTgt spid="2">
-                                            <p:txEl>
-                                              <p:pRg st="4" end="4"/>
-                                            </p:txEl>
-                                          </p:spTgt>
-                                        </p:tgtEl>
-                                      </p:cBhvr>
-                                    </p:animEffect>
-                                  </p:childTnLst>
-                                </p:cTn>
-                              </p:par>
-                              <p:par>
-                                <p:cTn id="26" presetID="10" presetClass="entr" presetSubtype="0" fill="hold" grpId="0" nodeType="withEffect">
-                                  <p:stCondLst>
-                                    <p:cond delay="0"/>
-                                  </p:stCondLst>
-                                  <p:childTnLst>
-                                    <p:set>
-                                      <p:cBhvr>
-                                        <p:cTn id="27" dur="1" fill="hold">
-                                          <p:stCondLst>
-                                            <p:cond delay="0"/>
-                                          </p:stCondLst>
-                                        </p:cTn>
-                                        <p:tgtEl>
-                                          <p:spTgt spid="2">
-                                            <p:txEl>
-                                              <p:pRg st="5" end="5"/>
-                                            </p:txEl>
-                                          </p:spTgt>
-                                        </p:tgtEl>
-                                        <p:attrNameLst>
-                                          <p:attrName>style.visibility</p:attrName>
-                                        </p:attrNameLst>
-                                      </p:cBhvr>
-                                      <p:to>
-                                        <p:strVal val="visible"/>
-                                      </p:to>
-                                    </p:set>
-                                    <p:animEffect transition="in" filter="fade">
-                                      <p:cBhvr>
-                                        <p:cTn id="28" dur="500"/>
-                                        <p:tgtEl>
-                                          <p:spTgt spid="2">
-                                            <p:txEl>
-                                              <p:pRg st="5" end="5"/>
-                                            </p:txEl>
-                                          </p:spTgt>
-                                        </p:tgtEl>
-                                      </p:cBhvr>
-                                    </p:animEffect>
-                                  </p:childTnLst>
-                                </p:cTn>
-                              </p:par>
-                              <p:par>
-                                <p:cTn id="29" presetID="10" presetClass="entr" presetSubtype="0" fill="hold" grpId="0" nodeType="withEffect">
-                                  <p:stCondLst>
-                                    <p:cond delay="0"/>
-                                  </p:stCondLst>
-                                  <p:childTnLst>
-                                    <p:set>
-                                      <p:cBhvr>
-                                        <p:cTn id="30" dur="1" fill="hold">
-                                          <p:stCondLst>
-                                            <p:cond delay="0"/>
-                                          </p:stCondLst>
-                                        </p:cTn>
-                                        <p:tgtEl>
-                                          <p:spTgt spid="2">
-                                            <p:txEl>
-                                              <p:pRg st="6" end="6"/>
-                                            </p:txEl>
-                                          </p:spTgt>
-                                        </p:tgtEl>
-                                        <p:attrNameLst>
-                                          <p:attrName>style.visibility</p:attrName>
-                                        </p:attrNameLst>
-                                      </p:cBhvr>
-                                      <p:to>
-                                        <p:strVal val="visible"/>
-                                      </p:to>
-                                    </p:set>
-                                    <p:animEffect transition="in" filter="fade">
-                                      <p:cBhvr>
-                                        <p:cTn id="31" dur="500"/>
-                                        <p:tgtEl>
-                                          <p:spTgt spid="2">
-                                            <p:txEl>
-                                              <p:pRg st="6" end="6"/>
                                             </p:txEl>
                                           </p:spTgt>
                                         </p:tgtEl>
@@ -6305,7 +6925,7 @@
           <p:cNvPr id="2" name="Content Placeholder 1">
             <a:extLst>
               <a:ext uri="{FF2B5EF4-FFF2-40B4-BE49-F238E27FC236}">
-                <a16:creationId xmlns:a16="http://schemas.microsoft.com/office/drawing/2014/main" id="{C2ED0E3D-33EF-46B7-A2C9-56A7082D8CF7}"/>
+                <a16:creationId xmlns:a16="http://schemas.microsoft.com/office/drawing/2014/main" id="{CA51C058-7710-450C-B21E-7660FCDE81A7}"/>
               </a:ext>
             </a:extLst>
           </p:cNvPr>
@@ -6318,165 +6938,63 @@
         </p:nvSpPr>
         <p:spPr/>
         <p:txBody>
-          <a:bodyPr>
-            <a:normAutofit/>
-          </a:bodyPr>
+          <a:bodyPr/>
           <a:lstStyle/>
           <a:p>
             <a:r>
               <a:rPr lang="en-CA" dirty="0"/>
-              <a:t>Provide statistical information and biological relevance </a:t>
-            </a:r>
-          </a:p>
-          <a:p>
+              <a:t>Three Narwhals tagged in Tremblay Sound</a:t>
+            </a:r>
+          </a:p>
+          <a:p>
+            <a:r>
+              <a:rPr lang="en-CA" dirty="0" err="1"/>
+              <a:t>Fastloc</a:t>
+            </a:r>
             <a:r>
               <a:rPr lang="en-CA" dirty="0"/>
-              <a:t>Requires special considerations when coding</a:t>
+              <a:t> GPS and ARGOS location data</a:t>
+            </a:r>
+          </a:p>
+          <a:p>
+            <a:r>
+              <a:rPr lang="en-CA" dirty="0"/>
+              <a:t>Mean depth data</a:t>
+            </a:r>
+          </a:p>
+          <a:p>
+            <a:r>
+              <a:rPr lang="en-CA" dirty="0"/>
+              <a:t>Temporal resolution:</a:t>
             </a:r>
           </a:p>
           <a:p>
             <a:pPr lvl="1"/>
             <a:r>
-              <a:rPr lang="en-US" dirty="0" err="1">
-                <a:latin typeface="Lucida Console" panose="020B0609040504020204" pitchFamily="49" charset="0"/>
-                <a:cs typeface="Courier New" panose="02070309020205020404" pitchFamily="49" charset="0"/>
-              </a:rPr>
-              <a:t>group_by</a:t>
-            </a:r>
-            <a:r>
-              <a:rPr lang="en-US" dirty="0">
-                <a:latin typeface="Lucida Console" panose="020B0609040504020204" pitchFamily="49" charset="0"/>
-                <a:cs typeface="Courier New" panose="02070309020205020404" pitchFamily="49" charset="0"/>
-              </a:rPr>
-              <a:t>(ID) %&gt;% </a:t>
-            </a:r>
-            <a:br>
-              <a:rPr lang="en-US" dirty="0">
-                <a:latin typeface="Lucida Console" panose="020B0609040504020204" pitchFamily="49" charset="0"/>
-                <a:cs typeface="Courier New" panose="02070309020205020404" pitchFamily="49" charset="0"/>
-              </a:rPr>
-            </a:br>
-            <a:r>
-              <a:rPr lang="en-US" dirty="0">
-                <a:latin typeface="Lucida Console" panose="020B0609040504020204" pitchFamily="49" charset="0"/>
-                <a:cs typeface="Courier New" panose="02070309020205020404" pitchFamily="49" charset="0"/>
-              </a:rPr>
-              <a:t>  </a:t>
-            </a:r>
-            <a:r>
-              <a:rPr lang="en-US" dirty="0" err="1">
-                <a:latin typeface="Lucida Console" panose="020B0609040504020204" pitchFamily="49" charset="0"/>
-                <a:cs typeface="Courier New" panose="02070309020205020404" pitchFamily="49" charset="0"/>
-              </a:rPr>
-              <a:t>summarise</a:t>
-            </a:r>
-            <a:r>
-              <a:rPr lang="en-US" dirty="0">
-                <a:latin typeface="Lucida Console" panose="020B0609040504020204" pitchFamily="49" charset="0"/>
-                <a:cs typeface="Courier New" panose="02070309020205020404" pitchFamily="49" charset="0"/>
-              </a:rPr>
-              <a:t>(…)</a:t>
+              <a:rPr lang="en-CA" dirty="0" err="1"/>
+              <a:t>Fastloc</a:t>
+            </a:r>
+            <a:r>
+              <a:rPr lang="en-CA" dirty="0"/>
+              <a:t> GPS: 10 min</a:t>
             </a:r>
           </a:p>
           <a:p>
             <a:pPr lvl="1"/>
             <a:r>
-              <a:rPr lang="en-US" dirty="0" err="1">
-                <a:latin typeface="Lucida Console" panose="020B0609040504020204" pitchFamily="49" charset="0"/>
-                <a:cs typeface="Courier New" panose="02070309020205020404" pitchFamily="49" charset="0"/>
-              </a:rPr>
-              <a:t>ifelse</a:t>
-            </a:r>
-            <a:r>
-              <a:rPr lang="en-US" dirty="0">
-                <a:latin typeface="Lucida Console" panose="020B0609040504020204" pitchFamily="49" charset="0"/>
-                <a:cs typeface="Courier New" panose="02070309020205020404" pitchFamily="49" charset="0"/>
-              </a:rPr>
-              <a:t>(ID == lead(ID), …, NA)</a:t>
+              <a:rPr lang="en-CA" dirty="0"/>
+              <a:t>ARGOS: irregular</a:t>
             </a:r>
           </a:p>
           <a:p>
             <a:pPr lvl="1"/>
             <a:r>
-              <a:rPr lang="en-US" dirty="0" err="1">
-                <a:latin typeface="Lucida Console" panose="020B0609040504020204" pitchFamily="49" charset="0"/>
-                <a:cs typeface="Courier New" panose="02070309020205020404" pitchFamily="49" charset="0"/>
-              </a:rPr>
-              <a:t>tracks_list</a:t>
-            </a:r>
-            <a:r>
-              <a:rPr lang="en-US" dirty="0">
-                <a:latin typeface="Lucida Console" panose="020B0609040504020204" pitchFamily="49" charset="0"/>
-                <a:cs typeface="Courier New" panose="02070309020205020404" pitchFamily="49" charset="0"/>
-              </a:rPr>
-              <a:t> &lt;- split(</a:t>
-            </a:r>
-            <a:r>
-              <a:rPr lang="en-US" dirty="0" err="1">
-                <a:latin typeface="Lucida Console" panose="020B0609040504020204" pitchFamily="49" charset="0"/>
-                <a:cs typeface="Courier New" panose="02070309020205020404" pitchFamily="49" charset="0"/>
-              </a:rPr>
-              <a:t>tracks_df</a:t>
-            </a:r>
-            <a:r>
-              <a:rPr lang="en-US" dirty="0">
-                <a:latin typeface="Lucida Console" panose="020B0609040504020204" pitchFamily="49" charset="0"/>
-                <a:cs typeface="Courier New" panose="02070309020205020404" pitchFamily="49" charset="0"/>
-              </a:rPr>
-              <a:t>, </a:t>
-            </a:r>
-            <a:r>
-              <a:rPr lang="en-US" dirty="0" err="1">
-                <a:latin typeface="Lucida Console" panose="020B0609040504020204" pitchFamily="49" charset="0"/>
-                <a:cs typeface="Courier New" panose="02070309020205020404" pitchFamily="49" charset="0"/>
-              </a:rPr>
-              <a:t>tracks_df$ID</a:t>
-            </a:r>
-            <a:r>
-              <a:rPr lang="en-US" dirty="0">
-                <a:latin typeface="Lucida Console" panose="020B0609040504020204" pitchFamily="49" charset="0"/>
-                <a:cs typeface="Courier New" panose="02070309020205020404" pitchFamily="49" charset="0"/>
-              </a:rPr>
-              <a:t>)</a:t>
-            </a:r>
-          </a:p>
-          <a:p>
-            <a:pPr lvl="2"/>
-            <a:r>
-              <a:rPr lang="en-US" dirty="0" err="1">
-                <a:latin typeface="Lucida Console" panose="020B0609040504020204" pitchFamily="49" charset="0"/>
-                <a:cs typeface="Courier New" panose="02070309020205020404" pitchFamily="49" charset="0"/>
-              </a:rPr>
-              <a:t>lapply</a:t>
-            </a:r>
-            <a:r>
-              <a:rPr lang="en-US" dirty="0">
-                <a:latin typeface="Lucida Console" panose="020B0609040504020204" pitchFamily="49" charset="0"/>
-                <a:cs typeface="Courier New" panose="02070309020205020404" pitchFamily="49" charset="0"/>
-              </a:rPr>
-              <a:t>(list, FUN)</a:t>
-            </a:r>
-            <a:endParaRPr lang="en-CA" dirty="0">
-              <a:latin typeface="Lucida Console" panose="020B0609040504020204" pitchFamily="49" charset="0"/>
-              <a:cs typeface="Courier New" panose="02070309020205020404" pitchFamily="49" charset="0"/>
-            </a:endParaRPr>
-          </a:p>
-          <a:p>
-            <a:pPr lvl="2"/>
-            <a:r>
-              <a:rPr lang="en-US" dirty="0" err="1">
-                <a:latin typeface="Lucida Console" panose="020B0609040504020204" pitchFamily="49" charset="0"/>
-                <a:cs typeface="Courier New" panose="02070309020205020404" pitchFamily="49" charset="0"/>
-              </a:rPr>
-              <a:t>mapply</a:t>
-            </a:r>
-            <a:r>
-              <a:rPr lang="en-US" dirty="0">
-                <a:latin typeface="Lucida Console" panose="020B0609040504020204" pitchFamily="49" charset="0"/>
-                <a:cs typeface="Courier New" panose="02070309020205020404" pitchFamily="49" charset="0"/>
-              </a:rPr>
-              <a:t>(FUN, list_1, list_2, SIMPLIFY = F)</a:t>
-            </a:r>
+              <a:rPr lang="en-CA" dirty="0"/>
+              <a:t>Depth data: 75 s</a:t>
+            </a:r>
+          </a:p>
+          <a:p>
+            <a:endParaRPr lang="en-US" dirty="0"/>
           </a:p>
         </p:txBody>
       </p:sp>
@@ -6485,7 +7003,7 @@
           <p:cNvPr id="3" name="Slide Number Placeholder 2">
             <a:extLst>
               <a:ext uri="{FF2B5EF4-FFF2-40B4-BE49-F238E27FC236}">
-                <a16:creationId xmlns:a16="http://schemas.microsoft.com/office/drawing/2014/main" id="{4185A828-4B6F-43B9-95C2-C612CB61F2CC}"/>
+                <a16:creationId xmlns:a16="http://schemas.microsoft.com/office/drawing/2014/main" id="{E0469174-1D07-447E-8E7F-A6C30711A0CA}"/>
               </a:ext>
             </a:extLst>
           </p:cNvPr>
@@ -6515,7 +7033,7 @@
           <p:cNvPr id="4" name="Title 3">
             <a:extLst>
               <a:ext uri="{FF2B5EF4-FFF2-40B4-BE49-F238E27FC236}">
-                <a16:creationId xmlns:a16="http://schemas.microsoft.com/office/drawing/2014/main" id="{49C30115-F240-425C-8B68-7AE0180CE018}"/>
+                <a16:creationId xmlns:a16="http://schemas.microsoft.com/office/drawing/2014/main" id="{8D39DE9B-B802-4CC3-AB9F-93A9C3664E9F}"/>
               </a:ext>
             </a:extLst>
           </p:cNvPr>
@@ -6533,7 +7051,7 @@
           <a:p>
             <a:r>
               <a:rPr lang="en-CA" dirty="0"/>
-              <a:t>1. Working with multiple individuals</a:t>
+              <a:t>Data</a:t>
             </a:r>
             <a:endParaRPr lang="en-US" dirty="0"/>
           </a:p>
@@ -6542,7 +7060,7 @@
     </p:spTree>
     <p:extLst>
       <p:ext uri="{BB962C8B-B14F-4D97-AF65-F5344CB8AC3E}">
-        <p14:creationId xmlns:p14="http://schemas.microsoft.com/office/powerpoint/2010/main" val="291983386"/>
+        <p14:creationId xmlns:p14="http://schemas.microsoft.com/office/powerpoint/2010/main" val="809460727"/>
       </p:ext>
     </p:extLst>
   </p:cSld>
@@ -6795,33 +7313,15 @@
                                   </p:childTnLst>
                                 </p:cTn>
                               </p:par>
-                            </p:childTnLst>
-                          </p:cTn>
-                        </p:par>
-                      </p:childTnLst>
-                    </p:cTn>
-                  </p:par>
-                  <p:par>
-                    <p:cTn id="23" fill="hold">
-                      <p:stCondLst>
-                        <p:cond delay="indefinite"/>
-                      </p:stCondLst>
-                      <p:childTnLst>
-                        <p:par>
-                          <p:cTn id="24" fill="hold">
-                            <p:stCondLst>
-                              <p:cond delay="0"/>
-                            </p:stCondLst>
-                            <p:childTnLst>
                               <p:par>
-                                <p:cTn id="25" presetID="10" presetClass="entr" presetSubtype="0" fill="hold" grpId="0" nodeType="clickEffect">
+                                <p:cTn id="23" presetID="10" presetClass="entr" presetSubtype="0" fill="hold" grpId="0" nodeType="withEffect">
                                   <p:stCondLst>
                                     <p:cond delay="0"/>
                                   </p:stCondLst>
                                   <p:childTnLst>
                                     <p:set>
                                       <p:cBhvr>
-                                        <p:cTn id="26" dur="1" fill="hold">
+                                        <p:cTn id="24" dur="1" fill="hold">
                                           <p:stCondLst>
                                             <p:cond delay="0"/>
                                           </p:stCondLst>
@@ -6843,7 +7343,7 @@
                                     </p:set>
                                     <p:animEffect transition="in" filter="fade">
                                       <p:cBhvr>
-                                        <p:cTn id="27" dur="500"/>
+                                        <p:cTn id="25" dur="500"/>
                                         <p:tgtEl>
                                           <p:spTgt spid="2">
                                             <p:txEl>
@@ -6856,33 +7356,15 @@
                                   </p:childTnLst>
                                 </p:cTn>
                               </p:par>
-                            </p:childTnLst>
-                          </p:cTn>
-                        </p:par>
-                      </p:childTnLst>
-                    </p:cTn>
-                  </p:par>
-                  <p:par>
-                    <p:cTn id="28" fill="hold">
-                      <p:stCondLst>
-                        <p:cond delay="indefinite"/>
-                      </p:stCondLst>
-                      <p:childTnLst>
-                        <p:par>
-                          <p:cTn id="29" fill="hold">
-                            <p:stCondLst>
-                              <p:cond delay="0"/>
-                            </p:stCondLst>
-                            <p:childTnLst>
                               <p:par>
-                                <p:cTn id="30" presetID="10" presetClass="entr" presetSubtype="0" fill="hold" grpId="0" nodeType="clickEffect">
+                                <p:cTn id="26" presetID="10" presetClass="entr" presetSubtype="0" fill="hold" grpId="0" nodeType="withEffect">
                                   <p:stCondLst>
                                     <p:cond delay="0"/>
                                   </p:stCondLst>
                                   <p:childTnLst>
                                     <p:set>
                                       <p:cBhvr>
-                                        <p:cTn id="31" dur="1" fill="hold">
+                                        <p:cTn id="27" dur="1" fill="hold">
                                           <p:stCondLst>
                                             <p:cond delay="0"/>
                                           </p:stCondLst>
@@ -6904,7 +7386,7 @@
                                     </p:set>
                                     <p:animEffect transition="in" filter="fade">
                                       <p:cBhvr>
-                                        <p:cTn id="32" dur="500"/>
+                                        <p:cTn id="28" dur="500"/>
                                         <p:tgtEl>
                                           <p:spTgt spid="2">
                                             <p:txEl>
@@ -6917,33 +7399,15 @@
                                   </p:childTnLst>
                                 </p:cTn>
                               </p:par>
-                            </p:childTnLst>
-                          </p:cTn>
-                        </p:par>
-                      </p:childTnLst>
-                    </p:cTn>
-                  </p:par>
-                  <p:par>
-                    <p:cTn id="33" fill="hold">
-                      <p:stCondLst>
-                        <p:cond delay="indefinite"/>
-                      </p:stCondLst>
-                      <p:childTnLst>
-                        <p:par>
-                          <p:cTn id="34" fill="hold">
-                            <p:stCondLst>
-                              <p:cond delay="0"/>
-                            </p:stCondLst>
-                            <p:childTnLst>
                               <p:par>
-                                <p:cTn id="35" presetID="10" presetClass="entr" presetSubtype="0" fill="hold" grpId="0" nodeType="clickEffect">
+                                <p:cTn id="29" presetID="10" presetClass="entr" presetSubtype="0" fill="hold" grpId="0" nodeType="withEffect">
                                   <p:stCondLst>
                                     <p:cond delay="0"/>
                                   </p:stCondLst>
                                   <p:childTnLst>
                                     <p:set>
                                       <p:cBhvr>
-                                        <p:cTn id="36" dur="1" fill="hold">
+                                        <p:cTn id="30" dur="1" fill="hold">
                                           <p:stCondLst>
                                             <p:cond delay="0"/>
                                           </p:stCondLst>
@@ -6965,7 +7429,7 @@
                                     </p:set>
                                     <p:animEffect transition="in" filter="fade">
                                       <p:cBhvr>
-                                        <p:cTn id="37" dur="500"/>
+                                        <p:cTn id="31" dur="500"/>
                                         <p:tgtEl>
                                           <p:spTgt spid="2">
                                             <p:txEl>
@@ -7031,6 +7495,735 @@
       </p:grpSpPr>
       <p:sp>
         <p:nvSpPr>
+          <p:cNvPr id="2" name="Content Placeholder 1">
+            <a:extLst>
+              <a:ext uri="{FF2B5EF4-FFF2-40B4-BE49-F238E27FC236}">
+                <a16:creationId xmlns:a16="http://schemas.microsoft.com/office/drawing/2014/main" id="{C2ED0E3D-33EF-46B7-A2C9-56A7082D8CF7}"/>
+              </a:ext>
+            </a:extLst>
+          </p:cNvPr>
+          <p:cNvSpPr>
+            <a:spLocks noGrp="1"/>
+          </p:cNvSpPr>
+          <p:nvPr>
+            <p:ph idx="1"/>
+          </p:nvPr>
+        </p:nvSpPr>
+        <p:spPr/>
+        <p:txBody>
+          <a:bodyPr>
+            <a:normAutofit/>
+          </a:bodyPr>
+          <a:lstStyle/>
+          <a:p>
+            <a:r>
+              <a:rPr lang="en-CA" dirty="0"/>
+              <a:t>Provide statistical information and biological relevance </a:t>
+            </a:r>
+          </a:p>
+          <a:p>
+            <a:r>
+              <a:rPr lang="en-CA" dirty="0"/>
+              <a:t>Requires special considerations when coding</a:t>
+            </a:r>
+          </a:p>
+          <a:p>
+            <a:pPr lvl="1"/>
+            <a:r>
+              <a:rPr lang="en-US" dirty="0" err="1">
+                <a:latin typeface="Lucida Console" panose="020B0609040504020204" pitchFamily="49" charset="0"/>
+                <a:cs typeface="Courier New" panose="02070309020205020404" pitchFamily="49" charset="0"/>
+              </a:rPr>
+              <a:t>group_by</a:t>
+            </a:r>
+            <a:r>
+              <a:rPr lang="en-US" dirty="0">
+                <a:latin typeface="Lucida Console" panose="020B0609040504020204" pitchFamily="49" charset="0"/>
+                <a:cs typeface="Courier New" panose="02070309020205020404" pitchFamily="49" charset="0"/>
+              </a:rPr>
+              <a:t>(ID) %&gt;% </a:t>
+            </a:r>
+            <a:br>
+              <a:rPr lang="en-US" dirty="0">
+                <a:latin typeface="Lucida Console" panose="020B0609040504020204" pitchFamily="49" charset="0"/>
+                <a:cs typeface="Courier New" panose="02070309020205020404" pitchFamily="49" charset="0"/>
+              </a:rPr>
+            </a:br>
+            <a:r>
+              <a:rPr lang="en-US" dirty="0">
+                <a:latin typeface="Lucida Console" panose="020B0609040504020204" pitchFamily="49" charset="0"/>
+                <a:cs typeface="Courier New" panose="02070309020205020404" pitchFamily="49" charset="0"/>
+              </a:rPr>
+              <a:t>  </a:t>
+            </a:r>
+            <a:r>
+              <a:rPr lang="en-US" dirty="0" err="1">
+                <a:latin typeface="Lucida Console" panose="020B0609040504020204" pitchFamily="49" charset="0"/>
+                <a:cs typeface="Courier New" panose="02070309020205020404" pitchFamily="49" charset="0"/>
+              </a:rPr>
+              <a:t>summarise</a:t>
+            </a:r>
+            <a:r>
+              <a:rPr lang="en-US" dirty="0">
+                <a:latin typeface="Lucida Console" panose="020B0609040504020204" pitchFamily="49" charset="0"/>
+                <a:cs typeface="Courier New" panose="02070309020205020404" pitchFamily="49" charset="0"/>
+              </a:rPr>
+              <a:t>(…)</a:t>
+            </a:r>
+          </a:p>
+          <a:p>
+            <a:pPr lvl="1"/>
+            <a:r>
+              <a:rPr lang="en-US" dirty="0" err="1">
+                <a:latin typeface="Lucida Console" panose="020B0609040504020204" pitchFamily="49" charset="0"/>
+                <a:cs typeface="Courier New" panose="02070309020205020404" pitchFamily="49" charset="0"/>
+              </a:rPr>
+              <a:t>ifelse</a:t>
+            </a:r>
+            <a:r>
+              <a:rPr lang="en-US" dirty="0">
+                <a:latin typeface="Lucida Console" panose="020B0609040504020204" pitchFamily="49" charset="0"/>
+                <a:cs typeface="Courier New" panose="02070309020205020404" pitchFamily="49" charset="0"/>
+              </a:rPr>
+              <a:t>(ID == lead(ID), …, NA)</a:t>
+            </a:r>
+          </a:p>
+          <a:p>
+            <a:pPr lvl="1"/>
+            <a:r>
+              <a:rPr lang="en-US" dirty="0" err="1">
+                <a:latin typeface="Lucida Console" panose="020B0609040504020204" pitchFamily="49" charset="0"/>
+                <a:cs typeface="Courier New" panose="02070309020205020404" pitchFamily="49" charset="0"/>
+              </a:rPr>
+              <a:t>tracks_list</a:t>
+            </a:r>
+            <a:r>
+              <a:rPr lang="en-US" dirty="0">
+                <a:latin typeface="Lucida Console" panose="020B0609040504020204" pitchFamily="49" charset="0"/>
+                <a:cs typeface="Courier New" panose="02070309020205020404" pitchFamily="49" charset="0"/>
+              </a:rPr>
+              <a:t> &lt;- split(</a:t>
+            </a:r>
+            <a:r>
+              <a:rPr lang="en-US" dirty="0" err="1">
+                <a:latin typeface="Lucida Console" panose="020B0609040504020204" pitchFamily="49" charset="0"/>
+                <a:cs typeface="Courier New" panose="02070309020205020404" pitchFamily="49" charset="0"/>
+              </a:rPr>
+              <a:t>tracks_df</a:t>
+            </a:r>
+            <a:r>
+              <a:rPr lang="en-US" dirty="0">
+                <a:latin typeface="Lucida Console" panose="020B0609040504020204" pitchFamily="49" charset="0"/>
+                <a:cs typeface="Courier New" panose="02070309020205020404" pitchFamily="49" charset="0"/>
+              </a:rPr>
+              <a:t>, </a:t>
+            </a:r>
+            <a:r>
+              <a:rPr lang="en-US" dirty="0" err="1">
+                <a:latin typeface="Lucida Console" panose="020B0609040504020204" pitchFamily="49" charset="0"/>
+                <a:cs typeface="Courier New" panose="02070309020205020404" pitchFamily="49" charset="0"/>
+              </a:rPr>
+              <a:t>tracks_df$ID</a:t>
+            </a:r>
+            <a:r>
+              <a:rPr lang="en-US" dirty="0">
+                <a:latin typeface="Lucida Console" panose="020B0609040504020204" pitchFamily="49" charset="0"/>
+                <a:cs typeface="Courier New" panose="02070309020205020404" pitchFamily="49" charset="0"/>
+              </a:rPr>
+              <a:t>)</a:t>
+            </a:r>
+          </a:p>
+          <a:p>
+            <a:pPr lvl="2"/>
+            <a:r>
+              <a:rPr lang="en-US" dirty="0" err="1">
+                <a:latin typeface="Lucida Console" panose="020B0609040504020204" pitchFamily="49" charset="0"/>
+                <a:cs typeface="Courier New" panose="02070309020205020404" pitchFamily="49" charset="0"/>
+              </a:rPr>
+              <a:t>lapply</a:t>
+            </a:r>
+            <a:r>
+              <a:rPr lang="en-US" dirty="0">
+                <a:latin typeface="Lucida Console" panose="020B0609040504020204" pitchFamily="49" charset="0"/>
+                <a:cs typeface="Courier New" panose="02070309020205020404" pitchFamily="49" charset="0"/>
+              </a:rPr>
+              <a:t>(list, FUN)</a:t>
+            </a:r>
+            <a:endParaRPr lang="en-CA" dirty="0">
+              <a:latin typeface="Lucida Console" panose="020B0609040504020204" pitchFamily="49" charset="0"/>
+              <a:cs typeface="Courier New" panose="02070309020205020404" pitchFamily="49" charset="0"/>
+            </a:endParaRPr>
+          </a:p>
+          <a:p>
+            <a:pPr lvl="2"/>
+            <a:r>
+              <a:rPr lang="en-US" dirty="0" err="1">
+                <a:latin typeface="Lucida Console" panose="020B0609040504020204" pitchFamily="49" charset="0"/>
+                <a:cs typeface="Courier New" panose="02070309020205020404" pitchFamily="49" charset="0"/>
+              </a:rPr>
+              <a:t>mapply</a:t>
+            </a:r>
+            <a:r>
+              <a:rPr lang="en-US" dirty="0">
+                <a:latin typeface="Lucida Console" panose="020B0609040504020204" pitchFamily="49" charset="0"/>
+                <a:cs typeface="Courier New" panose="02070309020205020404" pitchFamily="49" charset="0"/>
+              </a:rPr>
+              <a:t>(FUN, list_1, list_2, SIMPLIFY = F)</a:t>
+            </a:r>
+          </a:p>
+        </p:txBody>
+      </p:sp>
+      <p:sp>
+        <p:nvSpPr>
+          <p:cNvPr id="3" name="Slide Number Placeholder 2">
+            <a:extLst>
+              <a:ext uri="{FF2B5EF4-FFF2-40B4-BE49-F238E27FC236}">
+                <a16:creationId xmlns:a16="http://schemas.microsoft.com/office/drawing/2014/main" id="{4185A828-4B6F-43B9-95C2-C612CB61F2CC}"/>
+              </a:ext>
+            </a:extLst>
+          </p:cNvPr>
+          <p:cNvSpPr>
+            <a:spLocks noGrp="1"/>
+          </p:cNvSpPr>
+          <p:nvPr>
+            <p:ph type="sldNum" sz="quarter" idx="12"/>
+          </p:nvPr>
+        </p:nvSpPr>
+        <p:spPr/>
+        <p:txBody>
+          <a:bodyPr/>
+          <a:lstStyle/>
+          <a:p>
+            <a:fld id="{E50A8D5F-7A10-4D19-B2BD-04FE5CA3B31F}" type="slidenum">
+              <a:rPr lang="en-US" smtClean="0"/>
+              <a:pPr/>
+              <a:t>6</a:t>
+            </a:fld>
+            <a:endParaRPr lang="en-US" dirty="0"/>
+          </a:p>
+        </p:txBody>
+      </p:sp>
+      <p:sp>
+        <p:nvSpPr>
+          <p:cNvPr id="4" name="Title 3">
+            <a:extLst>
+              <a:ext uri="{FF2B5EF4-FFF2-40B4-BE49-F238E27FC236}">
+                <a16:creationId xmlns:a16="http://schemas.microsoft.com/office/drawing/2014/main" id="{49C30115-F240-425C-8B68-7AE0180CE018}"/>
+              </a:ext>
+            </a:extLst>
+          </p:cNvPr>
+          <p:cNvSpPr>
+            <a:spLocks noGrp="1"/>
+          </p:cNvSpPr>
+          <p:nvPr>
+            <p:ph type="title"/>
+          </p:nvPr>
+        </p:nvSpPr>
+        <p:spPr/>
+        <p:txBody>
+          <a:bodyPr/>
+          <a:lstStyle/>
+          <a:p>
+            <a:r>
+              <a:rPr lang="en-CA" dirty="0"/>
+              <a:t>1. Working with multiple individuals</a:t>
+            </a:r>
+            <a:endParaRPr lang="en-US" dirty="0"/>
+          </a:p>
+        </p:txBody>
+      </p:sp>
+    </p:spTree>
+    <p:extLst>
+      <p:ext uri="{BB962C8B-B14F-4D97-AF65-F5344CB8AC3E}">
+        <p14:creationId xmlns:p14="http://schemas.microsoft.com/office/powerpoint/2010/main" val="291983386"/>
+      </p:ext>
+    </p:extLst>
+  </p:cSld>
+  <p:clrMapOvr>
+    <a:masterClrMapping/>
+  </p:clrMapOvr>
+  <p:timing>
+    <p:tnLst>
+      <p:par>
+        <p:cTn id="1" dur="indefinite" restart="never" nodeType="tmRoot">
+          <p:childTnLst>
+            <p:seq concurrent="1" nextAc="seek">
+              <p:cTn id="2" dur="indefinite" nodeType="mainSeq">
+                <p:childTnLst>
+                  <p:par>
+                    <p:cTn id="3" fill="hold">
+                      <p:stCondLst>
+                        <p:cond delay="indefinite"/>
+                      </p:stCondLst>
+                      <p:childTnLst>
+                        <p:par>
+                          <p:cTn id="4" fill="hold">
+                            <p:stCondLst>
+                              <p:cond delay="0"/>
+                            </p:stCondLst>
+                            <p:childTnLst>
+                              <p:par>
+                                <p:cTn id="5" presetID="10" presetClass="entr" presetSubtype="0" fill="hold" grpId="0" nodeType="clickEffect">
+                                  <p:stCondLst>
+                                    <p:cond delay="0"/>
+                                  </p:stCondLst>
+                                  <p:childTnLst>
+                                    <p:set>
+                                      <p:cBhvr>
+                                        <p:cTn id="6" dur="1" fill="hold">
+                                          <p:stCondLst>
+                                            <p:cond delay="0"/>
+                                          </p:stCondLst>
+                                        </p:cTn>
+                                        <p:tgtEl>
+                                          <p:spTgt spid="2">
+                                            <p:txEl>
+                                              <p:pRg st="0" end="0"/>
+                                            </p:txEl>
+                                          </p:spTgt>
+                                        </p:tgtEl>
+                                        <p:attrNameLst>
+                                          <p:attrName>style.visibility</p:attrName>
+                                        </p:attrNameLst>
+                                      </p:cBhvr>
+                                      <p:to>
+                                        <p:strVal val="visible"/>
+                                      </p:to>
+                                    </p:set>
+                                    <p:animEffect transition="in" filter="fade">
+                                      <p:cBhvr>
+                                        <p:cTn id="7" dur="500"/>
+                                        <p:tgtEl>
+                                          <p:spTgt spid="2">
+                                            <p:txEl>
+                                              <p:pRg st="0" end="0"/>
+                                            </p:txEl>
+                                          </p:spTgt>
+                                        </p:tgtEl>
+                                      </p:cBhvr>
+                                    </p:animEffect>
+                                  </p:childTnLst>
+                                </p:cTn>
+                              </p:par>
+                            </p:childTnLst>
+                          </p:cTn>
+                        </p:par>
+                      </p:childTnLst>
+                    </p:cTn>
+                  </p:par>
+                  <p:par>
+                    <p:cTn id="8" fill="hold">
+                      <p:stCondLst>
+                        <p:cond delay="indefinite"/>
+                      </p:stCondLst>
+                      <p:childTnLst>
+                        <p:par>
+                          <p:cTn id="9" fill="hold">
+                            <p:stCondLst>
+                              <p:cond delay="0"/>
+                            </p:stCondLst>
+                            <p:childTnLst>
+                              <p:par>
+                                <p:cTn id="10" presetID="10" presetClass="entr" presetSubtype="0" fill="hold" grpId="0" nodeType="clickEffect">
+                                  <p:stCondLst>
+                                    <p:cond delay="0"/>
+                                  </p:stCondLst>
+                                  <p:childTnLst>
+                                    <p:set>
+                                      <p:cBhvr>
+                                        <p:cTn id="11" dur="1" fill="hold">
+                                          <p:stCondLst>
+                                            <p:cond delay="0"/>
+                                          </p:stCondLst>
+                                        </p:cTn>
+                                        <p:tgtEl>
+                                          <p:spTgt spid="2">
+                                            <p:txEl>
+                                              <p:pRg st="1" end="1"/>
+                                            </p:txEl>
+                                          </p:spTgt>
+                                        </p:tgtEl>
+                                        <p:attrNameLst>
+                                          <p:attrName>style.visibility</p:attrName>
+                                        </p:attrNameLst>
+                                      </p:cBhvr>
+                                      <p:to>
+                                        <p:strVal val="visible"/>
+                                      </p:to>
+                                    </p:set>
+                                    <p:animEffect transition="in" filter="fade">
+                                      <p:cBhvr>
+                                        <p:cTn id="12" dur="500"/>
+                                        <p:tgtEl>
+                                          <p:spTgt spid="2">
+                                            <p:txEl>
+                                              <p:pRg st="1" end="1"/>
+                                            </p:txEl>
+                                          </p:spTgt>
+                                        </p:tgtEl>
+                                      </p:cBhvr>
+                                    </p:animEffect>
+                                  </p:childTnLst>
+                                </p:cTn>
+                              </p:par>
+                            </p:childTnLst>
+                          </p:cTn>
+                        </p:par>
+                      </p:childTnLst>
+                    </p:cTn>
+                  </p:par>
+                  <p:par>
+                    <p:cTn id="13" fill="hold">
+                      <p:stCondLst>
+                        <p:cond delay="indefinite"/>
+                      </p:stCondLst>
+                      <p:childTnLst>
+                        <p:par>
+                          <p:cTn id="14" fill="hold">
+                            <p:stCondLst>
+                              <p:cond delay="0"/>
+                            </p:stCondLst>
+                            <p:childTnLst>
+                              <p:par>
+                                <p:cTn id="15" presetID="10" presetClass="entr" presetSubtype="0" fill="hold" grpId="0" nodeType="clickEffect">
+                                  <p:stCondLst>
+                                    <p:cond delay="0"/>
+                                  </p:stCondLst>
+                                  <p:childTnLst>
+                                    <p:set>
+                                      <p:cBhvr>
+                                        <p:cTn id="16" dur="1" fill="hold">
+                                          <p:stCondLst>
+                                            <p:cond delay="0"/>
+                                          </p:stCondLst>
+                                        </p:cTn>
+                                        <p:tgtEl>
+                                          <p:spTgt spid="2">
+                                            <p:txEl>
+                                              <p:pRg st="2" end="2"/>
+                                            </p:txEl>
+                                          </p:spTgt>
+                                        </p:tgtEl>
+                                        <p:attrNameLst>
+                                          <p:attrName>style.visibility</p:attrName>
+                                        </p:attrNameLst>
+                                      </p:cBhvr>
+                                      <p:to>
+                                        <p:strVal val="visible"/>
+                                      </p:to>
+                                    </p:set>
+                                    <p:animEffect transition="in" filter="fade">
+                                      <p:cBhvr>
+                                        <p:cTn id="17" dur="500"/>
+                                        <p:tgtEl>
+                                          <p:spTgt spid="2">
+                                            <p:txEl>
+                                              <p:pRg st="2" end="2"/>
+                                            </p:txEl>
+                                          </p:spTgt>
+                                        </p:tgtEl>
+                                      </p:cBhvr>
+                                    </p:animEffect>
+                                  </p:childTnLst>
+                                </p:cTn>
+                              </p:par>
+                            </p:childTnLst>
+                          </p:cTn>
+                        </p:par>
+                      </p:childTnLst>
+                    </p:cTn>
+                  </p:par>
+                  <p:par>
+                    <p:cTn id="18" fill="hold">
+                      <p:stCondLst>
+                        <p:cond delay="indefinite"/>
+                      </p:stCondLst>
+                      <p:childTnLst>
+                        <p:par>
+                          <p:cTn id="19" fill="hold">
+                            <p:stCondLst>
+                              <p:cond delay="0"/>
+                            </p:stCondLst>
+                            <p:childTnLst>
+                              <p:par>
+                                <p:cTn id="20" presetID="10" presetClass="entr" presetSubtype="0" fill="hold" grpId="0" nodeType="clickEffect">
+                                  <p:stCondLst>
+                                    <p:cond delay="0"/>
+                                  </p:stCondLst>
+                                  <p:childTnLst>
+                                    <p:set>
+                                      <p:cBhvr>
+                                        <p:cTn id="21" dur="1" fill="hold">
+                                          <p:stCondLst>
+                                            <p:cond delay="0"/>
+                                          </p:stCondLst>
+                                        </p:cTn>
+                                        <p:tgtEl>
+                                          <p:spTgt spid="2">
+                                            <p:txEl>
+                                              <p:pRg st="3" end="3"/>
+                                            </p:txEl>
+                                          </p:spTgt>
+                                        </p:tgtEl>
+                                        <p:attrNameLst>
+                                          <p:attrName>style.visibility</p:attrName>
+                                        </p:attrNameLst>
+                                      </p:cBhvr>
+                                      <p:to>
+                                        <p:strVal val="visible"/>
+                                      </p:to>
+                                    </p:set>
+                                    <p:animEffect transition="in" filter="fade">
+                                      <p:cBhvr>
+                                        <p:cTn id="22" dur="500"/>
+                                        <p:tgtEl>
+                                          <p:spTgt spid="2">
+                                            <p:txEl>
+                                              <p:pRg st="3" end="3"/>
+                                            </p:txEl>
+                                          </p:spTgt>
+                                        </p:tgtEl>
+                                      </p:cBhvr>
+                                    </p:animEffect>
+                                  </p:childTnLst>
+                                </p:cTn>
+                              </p:par>
+                            </p:childTnLst>
+                          </p:cTn>
+                        </p:par>
+                      </p:childTnLst>
+                    </p:cTn>
+                  </p:par>
+                  <p:par>
+                    <p:cTn id="23" fill="hold">
+                      <p:stCondLst>
+                        <p:cond delay="indefinite"/>
+                      </p:stCondLst>
+                      <p:childTnLst>
+                        <p:par>
+                          <p:cTn id="24" fill="hold">
+                            <p:stCondLst>
+                              <p:cond delay="0"/>
+                            </p:stCondLst>
+                            <p:childTnLst>
+                              <p:par>
+                                <p:cTn id="25" presetID="10" presetClass="entr" presetSubtype="0" fill="hold" grpId="0" nodeType="clickEffect">
+                                  <p:stCondLst>
+                                    <p:cond delay="0"/>
+                                  </p:stCondLst>
+                                  <p:childTnLst>
+                                    <p:set>
+                                      <p:cBhvr>
+                                        <p:cTn id="26" dur="1" fill="hold">
+                                          <p:stCondLst>
+                                            <p:cond delay="0"/>
+                                          </p:stCondLst>
+                                        </p:cTn>
+                                        <p:tgtEl>
+                                          <p:spTgt spid="2">
+                                            <p:txEl>
+                                              <p:pRg st="4" end="4"/>
+                                            </p:txEl>
+                                          </p:spTgt>
+                                        </p:tgtEl>
+                                        <p:attrNameLst>
+                                          <p:attrName>style.visibility</p:attrName>
+                                        </p:attrNameLst>
+                                      </p:cBhvr>
+                                      <p:to>
+                                        <p:strVal val="visible"/>
+                                      </p:to>
+                                    </p:set>
+                                    <p:animEffect transition="in" filter="fade">
+                                      <p:cBhvr>
+                                        <p:cTn id="27" dur="500"/>
+                                        <p:tgtEl>
+                                          <p:spTgt spid="2">
+                                            <p:txEl>
+                                              <p:pRg st="4" end="4"/>
+                                            </p:txEl>
+                                          </p:spTgt>
+                                        </p:tgtEl>
+                                      </p:cBhvr>
+                                    </p:animEffect>
+                                  </p:childTnLst>
+                                </p:cTn>
+                              </p:par>
+                            </p:childTnLst>
+                          </p:cTn>
+                        </p:par>
+                      </p:childTnLst>
+                    </p:cTn>
+                  </p:par>
+                  <p:par>
+                    <p:cTn id="28" fill="hold">
+                      <p:stCondLst>
+                        <p:cond delay="indefinite"/>
+                      </p:stCondLst>
+                      <p:childTnLst>
+                        <p:par>
+                          <p:cTn id="29" fill="hold">
+                            <p:stCondLst>
+                              <p:cond delay="0"/>
+                            </p:stCondLst>
+                            <p:childTnLst>
+                              <p:par>
+                                <p:cTn id="30" presetID="10" presetClass="entr" presetSubtype="0" fill="hold" grpId="0" nodeType="clickEffect">
+                                  <p:stCondLst>
+                                    <p:cond delay="0"/>
+                                  </p:stCondLst>
+                                  <p:childTnLst>
+                                    <p:set>
+                                      <p:cBhvr>
+                                        <p:cTn id="31" dur="1" fill="hold">
+                                          <p:stCondLst>
+                                            <p:cond delay="0"/>
+                                          </p:stCondLst>
+                                        </p:cTn>
+                                        <p:tgtEl>
+                                          <p:spTgt spid="2">
+                                            <p:txEl>
+                                              <p:pRg st="5" end="5"/>
+                                            </p:txEl>
+                                          </p:spTgt>
+                                        </p:tgtEl>
+                                        <p:attrNameLst>
+                                          <p:attrName>style.visibility</p:attrName>
+                                        </p:attrNameLst>
+                                      </p:cBhvr>
+                                      <p:to>
+                                        <p:strVal val="visible"/>
+                                      </p:to>
+                                    </p:set>
+                                    <p:animEffect transition="in" filter="fade">
+                                      <p:cBhvr>
+                                        <p:cTn id="32" dur="500"/>
+                                        <p:tgtEl>
+                                          <p:spTgt spid="2">
+                                            <p:txEl>
+                                              <p:pRg st="5" end="5"/>
+                                            </p:txEl>
+                                          </p:spTgt>
+                                        </p:tgtEl>
+                                      </p:cBhvr>
+                                    </p:animEffect>
+                                  </p:childTnLst>
+                                </p:cTn>
+                              </p:par>
+                            </p:childTnLst>
+                          </p:cTn>
+                        </p:par>
+                      </p:childTnLst>
+                    </p:cTn>
+                  </p:par>
+                  <p:par>
+                    <p:cTn id="33" fill="hold">
+                      <p:stCondLst>
+                        <p:cond delay="indefinite"/>
+                      </p:stCondLst>
+                      <p:childTnLst>
+                        <p:par>
+                          <p:cTn id="34" fill="hold">
+                            <p:stCondLst>
+                              <p:cond delay="0"/>
+                            </p:stCondLst>
+                            <p:childTnLst>
+                              <p:par>
+                                <p:cTn id="35" presetID="10" presetClass="entr" presetSubtype="0" fill="hold" grpId="0" nodeType="clickEffect">
+                                  <p:stCondLst>
+                                    <p:cond delay="0"/>
+                                  </p:stCondLst>
+                                  <p:childTnLst>
+                                    <p:set>
+                                      <p:cBhvr>
+                                        <p:cTn id="36" dur="1" fill="hold">
+                                          <p:stCondLst>
+                                            <p:cond delay="0"/>
+                                          </p:stCondLst>
+                                        </p:cTn>
+                                        <p:tgtEl>
+                                          <p:spTgt spid="2">
+                                            <p:txEl>
+                                              <p:pRg st="6" end="6"/>
+                                            </p:txEl>
+                                          </p:spTgt>
+                                        </p:tgtEl>
+                                        <p:attrNameLst>
+                                          <p:attrName>style.visibility</p:attrName>
+                                        </p:attrNameLst>
+                                      </p:cBhvr>
+                                      <p:to>
+                                        <p:strVal val="visible"/>
+                                      </p:to>
+                                    </p:set>
+                                    <p:animEffect transition="in" filter="fade">
+                                      <p:cBhvr>
+                                        <p:cTn id="37" dur="500"/>
+                                        <p:tgtEl>
+                                          <p:spTgt spid="2">
+                                            <p:txEl>
+                                              <p:pRg st="6" end="6"/>
+                                            </p:txEl>
+                                          </p:spTgt>
+                                        </p:tgtEl>
+                                      </p:cBhvr>
+                                    </p:animEffect>
+                                  </p:childTnLst>
+                                </p:cTn>
+                              </p:par>
+                            </p:childTnLst>
+                          </p:cTn>
+                        </p:par>
+                      </p:childTnLst>
+                    </p:cTn>
+                  </p:par>
+                </p:childTnLst>
+              </p:cTn>
+              <p:prevCondLst>
+                <p:cond evt="onPrev" delay="0">
+                  <p:tgtEl>
+                    <p:sldTgt/>
+                  </p:tgtEl>
+                </p:cond>
+              </p:prevCondLst>
+              <p:nextCondLst>
+                <p:cond evt="onNext" delay="0">
+                  <p:tgtEl>
+                    <p:sldTgt/>
+                  </p:tgtEl>
+                </p:cond>
+              </p:nextCondLst>
+            </p:seq>
+          </p:childTnLst>
+        </p:cTn>
+      </p:par>
+    </p:tnLst>
+    <p:bldLst>
+      <p:bldP spid="2" grpId="0" build="p"/>
+    </p:bldLst>
+  </p:timing>
+</p:sld>
+</file>
+
+<file path=ppt/slides/slide7.xml><?xml version="1.0" encoding="utf-8"?>
+<p:sld xmlns:a="http://schemas.openxmlformats.org/drawingml/2006/main" xmlns:r="http://schemas.openxmlformats.org/officeDocument/2006/relationships" xmlns:p="http://schemas.openxmlformats.org/presentationml/2006/main">
+  <p:cSld>
+    <p:spTree>
+      <p:nvGrpSpPr>
+        <p:cNvPr id="1" name=""/>
+        <p:cNvGrpSpPr/>
+        <p:nvPr/>
+      </p:nvGrpSpPr>
+      <p:grpSpPr>
+        <a:xfrm>
+          <a:off x="0" y="0"/>
+          <a:ext cx="0" cy="0"/>
+          <a:chOff x="0" y="0"/>
+          <a:chExt cx="0" cy="0"/>
+        </a:xfrm>
+      </p:grpSpPr>
+      <p:sp>
+        <p:nvSpPr>
           <p:cNvPr id="17" name="Content Placeholder 16">
             <a:extLst>
               <a:ext uri="{FF2B5EF4-FFF2-40B4-BE49-F238E27FC236}">
@@ -7138,7 +8331,7 @@
             <a:fld id="{E50A8D5F-7A10-4D19-B2BD-04FE5CA3B31F}" type="slidenum">
               <a:rPr lang="en-US" smtClean="0"/>
               <a:pPr/>
-              <a:t>6</a:t>
+              <a:t>7</a:t>
             </a:fld>
             <a:endParaRPr lang="en-US" dirty="0"/>
           </a:p>
@@ -7553,7 +8746,7 @@
 </p:sld>
 </file>
 
-<file path=ppt/slides/slide7.xml><?xml version="1.0" encoding="utf-8"?>
+<file path=ppt/slides/slide8.xml><?xml version="1.0" encoding="utf-8"?>
 <p:sld xmlns:a="http://schemas.openxmlformats.org/drawingml/2006/main" xmlns:r="http://schemas.openxmlformats.org/officeDocument/2006/relationships" xmlns:p="http://schemas.openxmlformats.org/presentationml/2006/main">
   <p:cSld>
     <p:spTree>
@@ -7686,7 +8879,7 @@
           <a:graphicData uri="http://schemas.openxmlformats.org/presentationml/2006/ole">
             <mc:AlternateContent xmlns:mc="http://schemas.openxmlformats.org/markup-compatibility/2006">
               <mc:Choice xmlns:v="urn:schemas-microsoft-com:vml" Requires="v">
-                <p:oleObj spid="_x0000_s1037" r:id="rId6" imgW="25599960" imgH="13117320" progId="">
+                <p:oleObj spid="_x0000_s1043" r:id="rId6" imgW="25599960" imgH="13117320" progId="">
                   <p:embed/>
                 </p:oleObj>
               </mc:Choice>
@@ -7749,7 +8942,7 @@
           <a:graphicData uri="http://schemas.openxmlformats.org/presentationml/2006/ole">
             <mc:AlternateContent xmlns:mc="http://schemas.openxmlformats.org/markup-compatibility/2006">
               <mc:Choice xmlns:v="urn:schemas-microsoft-com:vml" Requires="v">
-                <p:oleObj spid="_x0000_s1038" r:id="rId8" imgW="25599960" imgH="13117320" progId="">
+                <p:oleObj spid="_x0000_s1044" r:id="rId8" imgW="25599960" imgH="13117320" progId="">
                   <p:embed/>
                 </p:oleObj>
               </mc:Choice>
@@ -7877,7 +9070,7 @@
             <a:fld id="{E50A8D5F-7A10-4D19-B2BD-04FE5CA3B31F}" type="slidenum">
               <a:rPr lang="en-US" smtClean="0"/>
               <a:pPr/>
-              <a:t>7</a:t>
+              <a:t>8</a:t>
             </a:fld>
             <a:endParaRPr lang="en-US" dirty="0"/>
           </a:p>
@@ -8496,7 +9689,7 @@
 </p:sld>
 </file>
 
-<file path=ppt/slides/slide8.xml><?xml version="1.0" encoding="utf-8"?>
+<file path=ppt/slides/slide9.xml><?xml version="1.0" encoding="utf-8"?>
 <p:sld xmlns:a="http://schemas.openxmlformats.org/drawingml/2006/main" xmlns:r="http://schemas.openxmlformats.org/officeDocument/2006/relationships" xmlns:p="http://schemas.openxmlformats.org/presentationml/2006/main">
   <p:cSld>
     <p:spTree>
@@ -8695,7 +9888,7 @@
             <a:fld id="{E50A8D5F-7A10-4D19-B2BD-04FE5CA3B31F}" type="slidenum">
               <a:rPr lang="en-US" smtClean="0"/>
               <a:pPr/>
-              <a:t>8</a:t>
+              <a:t>9</a:t>
             </a:fld>
             <a:endParaRPr lang="en-US" dirty="0"/>
           </a:p>
@@ -9209,661 +10402,6 @@
     </p:tnLst>
     <p:bldLst>
       <p:bldP spid="2" grpId="0" build="p"/>
-    </p:bldLst>
-  </p:timing>
-</p:sld>
-</file>
-
-<file path=ppt/slides/slide9.xml><?xml version="1.0" encoding="utf-8"?>
-<p:sld xmlns:a="http://schemas.openxmlformats.org/drawingml/2006/main" xmlns:r="http://schemas.openxmlformats.org/officeDocument/2006/relationships" xmlns:p="http://schemas.openxmlformats.org/presentationml/2006/main">
-  <p:cSld>
-    <p:spTree>
-      <p:nvGrpSpPr>
-        <p:cNvPr id="1" name=""/>
-        <p:cNvGrpSpPr/>
-        <p:nvPr/>
-      </p:nvGrpSpPr>
-      <p:grpSpPr>
-        <a:xfrm>
-          <a:off x="0" y="0"/>
-          <a:ext cx="0" cy="0"/>
-          <a:chOff x="0" y="0"/>
-          <a:chExt cx="0" cy="0"/>
-        </a:xfrm>
-      </p:grpSpPr>
-      <p:sp>
-        <p:nvSpPr>
-          <p:cNvPr id="2" name="Content Placeholder 1">
-            <a:extLst>
-              <a:ext uri="{FF2B5EF4-FFF2-40B4-BE49-F238E27FC236}">
-                <a16:creationId xmlns:a16="http://schemas.microsoft.com/office/drawing/2014/main" id="{7A530896-B549-4891-9A95-1F6A5687FC0D}"/>
-              </a:ext>
-            </a:extLst>
-          </p:cNvPr>
-          <p:cNvSpPr>
-            <a:spLocks noGrp="1"/>
-          </p:cNvSpPr>
-          <p:nvPr>
-            <p:ph idx="1"/>
-          </p:nvPr>
-        </p:nvSpPr>
-        <p:spPr/>
-        <p:txBody>
-          <a:bodyPr/>
-          <a:lstStyle/>
-          <a:p>
-            <a:r>
-              <a:rPr lang="en-US" dirty="0"/>
-              <a:t>Calculate dive metrics using </a:t>
-            </a:r>
-            <a:r>
-              <a:rPr lang="en-US" dirty="0" err="1">
-                <a:latin typeface="Lucida Console" panose="020B0609040504020204" pitchFamily="49" charset="0"/>
-              </a:rPr>
-              <a:t>diveMove</a:t>
-            </a:r>
-            <a:r>
-              <a:rPr lang="en-US" dirty="0"/>
-              <a:t> package: </a:t>
-            </a:r>
-          </a:p>
-          <a:p>
-            <a:pPr marL="907200" lvl="1" indent="-457200">
-              <a:buFont typeface="+mj-lt"/>
-              <a:buAutoNum type="arabicPeriod"/>
-            </a:pPr>
-            <a:r>
-              <a:rPr lang="en-US" dirty="0"/>
-              <a:t>Create TDR class using </a:t>
-            </a:r>
-            <a:r>
-              <a:rPr lang="en-US" dirty="0" err="1">
-                <a:latin typeface="Lucida Console" panose="020B0609040504020204" pitchFamily="49" charset="0"/>
-              </a:rPr>
-              <a:t>createTDR</a:t>
-            </a:r>
-            <a:endParaRPr lang="en-US" dirty="0">
-              <a:latin typeface="Lucida Console" panose="020B0609040504020204" pitchFamily="49" charset="0"/>
-            </a:endParaRPr>
-          </a:p>
-          <a:p>
-            <a:pPr marL="907200" lvl="1" indent="-457200">
-              <a:buFont typeface="+mj-lt"/>
-              <a:buAutoNum type="arabicPeriod"/>
-            </a:pPr>
-            <a:r>
-              <a:rPr lang="en-CA" dirty="0"/>
-              <a:t>Calibrate TDR data using </a:t>
-            </a:r>
-            <a:r>
-              <a:rPr lang="en-CA" dirty="0" err="1">
-                <a:latin typeface="Lucida Console" panose="020B0609040504020204" pitchFamily="49" charset="0"/>
-              </a:rPr>
-              <a:t>calibrateDepth</a:t>
-            </a:r>
-            <a:endParaRPr lang="en-CA" dirty="0">
-              <a:latin typeface="Lucida Console" panose="020B0609040504020204" pitchFamily="49" charset="0"/>
-            </a:endParaRPr>
-          </a:p>
-          <a:p>
-            <a:pPr marL="907200" lvl="1" indent="-457200">
-              <a:buFont typeface="+mj-lt"/>
-              <a:buAutoNum type="arabicPeriod"/>
-            </a:pPr>
-            <a:r>
-              <a:rPr lang="en-CA" dirty="0"/>
-              <a:t>Calculate dive statistics using </a:t>
-            </a:r>
-            <a:r>
-              <a:rPr lang="en-CA" dirty="0" err="1">
-                <a:latin typeface="Lucida Console" panose="020B0609040504020204" pitchFamily="49" charset="0"/>
-              </a:rPr>
-              <a:t>diveStats</a:t>
-            </a:r>
-            <a:endParaRPr lang="en-US" dirty="0"/>
-          </a:p>
-          <a:p>
-            <a:r>
-              <a:rPr lang="en-CA" dirty="0"/>
-              <a:t>Combine data streams with different resolutions</a:t>
-            </a:r>
-          </a:p>
-          <a:p>
-            <a:pPr marL="964350" lvl="1" indent="-514350">
-              <a:buFont typeface="+mj-lt"/>
-              <a:buAutoNum type="arabicPeriod"/>
-            </a:pPr>
-            <a:r>
-              <a:rPr lang="en-CA" dirty="0"/>
-              <a:t>Summarise dive stats using </a:t>
-            </a:r>
-            <a:r>
-              <a:rPr lang="en-CA" dirty="0" err="1">
-                <a:latin typeface="Lucida Console" panose="020B0609040504020204" pitchFamily="49" charset="0"/>
-              </a:rPr>
-              <a:t>dplyr</a:t>
-            </a:r>
-            <a:r>
-              <a:rPr lang="en-CA" dirty="0">
-                <a:latin typeface="Lucida Console" panose="020B0609040504020204" pitchFamily="49" charset="0"/>
-              </a:rPr>
-              <a:t>:: summarise</a:t>
-            </a:r>
-          </a:p>
-          <a:p>
-            <a:pPr marL="964350" lvl="1" indent="-514350">
-              <a:buFont typeface="+mj-lt"/>
-              <a:buAutoNum type="arabicPeriod"/>
-            </a:pPr>
-            <a:endParaRPr lang="en-CA" dirty="0">
-              <a:latin typeface="Lucida Console" panose="020B0609040504020204" pitchFamily="49" charset="0"/>
-            </a:endParaRPr>
-          </a:p>
-          <a:p>
-            <a:pPr marL="450000" lvl="1" indent="0">
-              <a:buNone/>
-            </a:pPr>
-            <a:r>
-              <a:rPr lang="en-CA" dirty="0">
-                <a:latin typeface="Lucida Console" panose="020B0609040504020204" pitchFamily="49" charset="0"/>
-              </a:rPr>
-              <a:t>Add Plot of dive label with different dive metrics</a:t>
-            </a:r>
-            <a:endParaRPr lang="en-CA" dirty="0"/>
-          </a:p>
-        </p:txBody>
-      </p:sp>
-      <p:sp>
-        <p:nvSpPr>
-          <p:cNvPr id="3" name="Slide Number Placeholder 2">
-            <a:extLst>
-              <a:ext uri="{FF2B5EF4-FFF2-40B4-BE49-F238E27FC236}">
-                <a16:creationId xmlns:a16="http://schemas.microsoft.com/office/drawing/2014/main" id="{7C61CF3A-D551-413D-B565-0B044BDD2B19}"/>
-              </a:ext>
-            </a:extLst>
-          </p:cNvPr>
-          <p:cNvSpPr>
-            <a:spLocks noGrp="1"/>
-          </p:cNvSpPr>
-          <p:nvPr>
-            <p:ph type="sldNum" sz="quarter" idx="12"/>
-          </p:nvPr>
-        </p:nvSpPr>
-        <p:spPr/>
-        <p:txBody>
-          <a:bodyPr/>
-          <a:lstStyle/>
-          <a:p>
-            <a:fld id="{E50A8D5F-7A10-4D19-B2BD-04FE5CA3B31F}" type="slidenum">
-              <a:rPr lang="en-US" smtClean="0"/>
-              <a:pPr/>
-              <a:t>9</a:t>
-            </a:fld>
-            <a:endParaRPr lang="en-US" dirty="0"/>
-          </a:p>
-        </p:txBody>
-      </p:sp>
-      <p:sp>
-        <p:nvSpPr>
-          <p:cNvPr id="4" name="Title 3">
-            <a:extLst>
-              <a:ext uri="{FF2B5EF4-FFF2-40B4-BE49-F238E27FC236}">
-                <a16:creationId xmlns:a16="http://schemas.microsoft.com/office/drawing/2014/main" id="{8173C622-1A8A-4EB6-9EA1-A634F4D6C0A7}"/>
-              </a:ext>
-            </a:extLst>
-          </p:cNvPr>
-          <p:cNvSpPr>
-            <a:spLocks noGrp="1"/>
-          </p:cNvSpPr>
-          <p:nvPr>
-            <p:ph type="title"/>
-          </p:nvPr>
-        </p:nvSpPr>
-        <p:spPr/>
-        <p:txBody>
-          <a:bodyPr/>
-          <a:lstStyle/>
-          <a:p>
-            <a:r>
-              <a:rPr lang="en-CA" dirty="0"/>
-              <a:t>4. Integrating dive data</a:t>
-            </a:r>
-            <a:endParaRPr lang="en-US" dirty="0"/>
-          </a:p>
-        </p:txBody>
-      </p:sp>
-    </p:spTree>
-    <p:extLst>
-      <p:ext uri="{BB962C8B-B14F-4D97-AF65-F5344CB8AC3E}">
-        <p14:creationId xmlns:p14="http://schemas.microsoft.com/office/powerpoint/2010/main" val="83839828"/>
-      </p:ext>
-    </p:extLst>
-  </p:cSld>
-  <p:clrMapOvr>
-    <a:masterClrMapping/>
-  </p:clrMapOvr>
-  <p:timing>
-    <p:tnLst>
-      <p:par>
-        <p:cTn id="1" dur="indefinite" restart="never" nodeType="tmRoot">
-          <p:childTnLst>
-            <p:seq concurrent="1" nextAc="seek">
-              <p:cTn id="2" dur="indefinite" nodeType="mainSeq">
-                <p:childTnLst>
-                  <p:par>
-                    <p:cTn id="3" fill="hold">
-                      <p:stCondLst>
-                        <p:cond delay="indefinite"/>
-                      </p:stCondLst>
-                      <p:childTnLst>
-                        <p:par>
-                          <p:cTn id="4" fill="hold">
-                            <p:stCondLst>
-                              <p:cond delay="0"/>
-                            </p:stCondLst>
-                            <p:childTnLst>
-                              <p:par>
-                                <p:cTn id="5" presetID="10" presetClass="entr" presetSubtype="0" fill="hold" grpId="0" nodeType="clickEffect">
-                                  <p:stCondLst>
-                                    <p:cond delay="0"/>
-                                  </p:stCondLst>
-                                  <p:childTnLst>
-                                    <p:set>
-                                      <p:cBhvr>
-                                        <p:cTn id="6" dur="1" fill="hold">
-                                          <p:stCondLst>
-                                            <p:cond delay="0"/>
-                                          </p:stCondLst>
-                                        </p:cTn>
-                                        <p:tgtEl>
-                                          <p:spTgt spid="2">
-                                            <p:txEl>
-                                              <p:pRg st="0" end="0"/>
-                                            </p:txEl>
-                                          </p:spTgt>
-                                        </p:tgtEl>
-                                        <p:attrNameLst>
-                                          <p:attrName>style.visibility</p:attrName>
-                                        </p:attrNameLst>
-                                      </p:cBhvr>
-                                      <p:to>
-                                        <p:strVal val="visible"/>
-                                      </p:to>
-                                    </p:set>
-                                    <p:animEffect transition="in" filter="fade">
-                                      <p:cBhvr>
-                                        <p:cTn id="7" dur="500"/>
-                                        <p:tgtEl>
-                                          <p:spTgt spid="2">
-                                            <p:txEl>
-                                              <p:pRg st="0" end="0"/>
-                                            </p:txEl>
-                                          </p:spTgt>
-                                        </p:tgtEl>
-                                      </p:cBhvr>
-                                    </p:animEffect>
-                                  </p:childTnLst>
-                                </p:cTn>
-                              </p:par>
-                            </p:childTnLst>
-                          </p:cTn>
-                        </p:par>
-                      </p:childTnLst>
-                    </p:cTn>
-                  </p:par>
-                  <p:par>
-                    <p:cTn id="8" fill="hold">
-                      <p:stCondLst>
-                        <p:cond delay="indefinite"/>
-                      </p:stCondLst>
-                      <p:childTnLst>
-                        <p:par>
-                          <p:cTn id="9" fill="hold">
-                            <p:stCondLst>
-                              <p:cond delay="0"/>
-                            </p:stCondLst>
-                            <p:childTnLst>
-                              <p:par>
-                                <p:cTn id="10" presetID="10" presetClass="entr" presetSubtype="0" fill="hold" grpId="0" nodeType="clickEffect">
-                                  <p:stCondLst>
-                                    <p:cond delay="0"/>
-                                  </p:stCondLst>
-                                  <p:childTnLst>
-                                    <p:set>
-                                      <p:cBhvr>
-                                        <p:cTn id="11" dur="1" fill="hold">
-                                          <p:stCondLst>
-                                            <p:cond delay="0"/>
-                                          </p:stCondLst>
-                                        </p:cTn>
-                                        <p:tgtEl>
-                                          <p:spTgt spid="2">
-                                            <p:txEl>
-                                              <p:pRg st="1" end="1"/>
-                                            </p:txEl>
-                                          </p:spTgt>
-                                        </p:tgtEl>
-                                        <p:attrNameLst>
-                                          <p:attrName>style.visibility</p:attrName>
-                                        </p:attrNameLst>
-                                      </p:cBhvr>
-                                      <p:to>
-                                        <p:strVal val="visible"/>
-                                      </p:to>
-                                    </p:set>
-                                    <p:animEffect transition="in" filter="fade">
-                                      <p:cBhvr>
-                                        <p:cTn id="12" dur="500"/>
-                                        <p:tgtEl>
-                                          <p:spTgt spid="2">
-                                            <p:txEl>
-                                              <p:pRg st="1" end="1"/>
-                                            </p:txEl>
-                                          </p:spTgt>
-                                        </p:tgtEl>
-                                      </p:cBhvr>
-                                    </p:animEffect>
-                                  </p:childTnLst>
-                                </p:cTn>
-                              </p:par>
-                            </p:childTnLst>
-                          </p:cTn>
-                        </p:par>
-                      </p:childTnLst>
-                    </p:cTn>
-                  </p:par>
-                  <p:par>
-                    <p:cTn id="13" fill="hold">
-                      <p:stCondLst>
-                        <p:cond delay="indefinite"/>
-                      </p:stCondLst>
-                      <p:childTnLst>
-                        <p:par>
-                          <p:cTn id="14" fill="hold">
-                            <p:stCondLst>
-                              <p:cond delay="0"/>
-                            </p:stCondLst>
-                            <p:childTnLst>
-                              <p:par>
-                                <p:cTn id="15" presetID="10" presetClass="entr" presetSubtype="0" fill="hold" grpId="0" nodeType="clickEffect">
-                                  <p:stCondLst>
-                                    <p:cond delay="0"/>
-                                  </p:stCondLst>
-                                  <p:childTnLst>
-                                    <p:set>
-                                      <p:cBhvr>
-                                        <p:cTn id="16" dur="1" fill="hold">
-                                          <p:stCondLst>
-                                            <p:cond delay="0"/>
-                                          </p:stCondLst>
-                                        </p:cTn>
-                                        <p:tgtEl>
-                                          <p:spTgt spid="2">
-                                            <p:txEl>
-                                              <p:pRg st="2" end="2"/>
-                                            </p:txEl>
-                                          </p:spTgt>
-                                        </p:tgtEl>
-                                        <p:attrNameLst>
-                                          <p:attrName>style.visibility</p:attrName>
-                                        </p:attrNameLst>
-                                      </p:cBhvr>
-                                      <p:to>
-                                        <p:strVal val="visible"/>
-                                      </p:to>
-                                    </p:set>
-                                    <p:animEffect transition="in" filter="fade">
-                                      <p:cBhvr>
-                                        <p:cTn id="17" dur="500"/>
-                                        <p:tgtEl>
-                                          <p:spTgt spid="2">
-                                            <p:txEl>
-                                              <p:pRg st="2" end="2"/>
-                                            </p:txEl>
-                                          </p:spTgt>
-                                        </p:tgtEl>
-                                      </p:cBhvr>
-                                    </p:animEffect>
-                                  </p:childTnLst>
-                                </p:cTn>
-                              </p:par>
-                            </p:childTnLst>
-                          </p:cTn>
-                        </p:par>
-                      </p:childTnLst>
-                    </p:cTn>
-                  </p:par>
-                  <p:par>
-                    <p:cTn id="18" fill="hold">
-                      <p:stCondLst>
-                        <p:cond delay="indefinite"/>
-                      </p:stCondLst>
-                      <p:childTnLst>
-                        <p:par>
-                          <p:cTn id="19" fill="hold">
-                            <p:stCondLst>
-                              <p:cond delay="0"/>
-                            </p:stCondLst>
-                            <p:childTnLst>
-                              <p:par>
-                                <p:cTn id="20" presetID="10" presetClass="entr" presetSubtype="0" fill="hold" grpId="0" nodeType="clickEffect">
-                                  <p:stCondLst>
-                                    <p:cond delay="0"/>
-                                  </p:stCondLst>
-                                  <p:childTnLst>
-                                    <p:set>
-                                      <p:cBhvr>
-                                        <p:cTn id="21" dur="1" fill="hold">
-                                          <p:stCondLst>
-                                            <p:cond delay="0"/>
-                                          </p:stCondLst>
-                                        </p:cTn>
-                                        <p:tgtEl>
-                                          <p:spTgt spid="2">
-                                            <p:txEl>
-                                              <p:pRg st="3" end="3"/>
-                                            </p:txEl>
-                                          </p:spTgt>
-                                        </p:tgtEl>
-                                        <p:attrNameLst>
-                                          <p:attrName>style.visibility</p:attrName>
-                                        </p:attrNameLst>
-                                      </p:cBhvr>
-                                      <p:to>
-                                        <p:strVal val="visible"/>
-                                      </p:to>
-                                    </p:set>
-                                    <p:animEffect transition="in" filter="fade">
-                                      <p:cBhvr>
-                                        <p:cTn id="22" dur="500"/>
-                                        <p:tgtEl>
-                                          <p:spTgt spid="2">
-                                            <p:txEl>
-                                              <p:pRg st="3" end="3"/>
-                                            </p:txEl>
-                                          </p:spTgt>
-                                        </p:tgtEl>
-                                      </p:cBhvr>
-                                    </p:animEffect>
-                                  </p:childTnLst>
-                                </p:cTn>
-                              </p:par>
-                            </p:childTnLst>
-                          </p:cTn>
-                        </p:par>
-                      </p:childTnLst>
-                    </p:cTn>
-                  </p:par>
-                  <p:par>
-                    <p:cTn id="23" fill="hold">
-                      <p:stCondLst>
-                        <p:cond delay="indefinite"/>
-                      </p:stCondLst>
-                      <p:childTnLst>
-                        <p:par>
-                          <p:cTn id="24" fill="hold">
-                            <p:stCondLst>
-                              <p:cond delay="0"/>
-                            </p:stCondLst>
-                            <p:childTnLst>
-                              <p:par>
-                                <p:cTn id="25" presetID="10" presetClass="entr" presetSubtype="0" fill="hold" grpId="0" nodeType="clickEffect">
-                                  <p:stCondLst>
-                                    <p:cond delay="0"/>
-                                  </p:stCondLst>
-                                  <p:childTnLst>
-                                    <p:set>
-                                      <p:cBhvr>
-                                        <p:cTn id="26" dur="1" fill="hold">
-                                          <p:stCondLst>
-                                            <p:cond delay="0"/>
-                                          </p:stCondLst>
-                                        </p:cTn>
-                                        <p:tgtEl>
-                                          <p:spTgt spid="2">
-                                            <p:txEl>
-                                              <p:pRg st="4" end="4"/>
-                                            </p:txEl>
-                                          </p:spTgt>
-                                        </p:tgtEl>
-                                        <p:attrNameLst>
-                                          <p:attrName>style.visibility</p:attrName>
-                                        </p:attrNameLst>
-                                      </p:cBhvr>
-                                      <p:to>
-                                        <p:strVal val="visible"/>
-                                      </p:to>
-                                    </p:set>
-                                    <p:animEffect transition="in" filter="fade">
-                                      <p:cBhvr>
-                                        <p:cTn id="27" dur="500"/>
-                                        <p:tgtEl>
-                                          <p:spTgt spid="2">
-                                            <p:txEl>
-                                              <p:pRg st="4" end="4"/>
-                                            </p:txEl>
-                                          </p:spTgt>
-                                        </p:tgtEl>
-                                      </p:cBhvr>
-                                    </p:animEffect>
-                                  </p:childTnLst>
-                                </p:cTn>
-                              </p:par>
-                              <p:par>
-                                <p:cTn id="28" presetID="10" presetClass="entr" presetSubtype="0" fill="hold" grpId="0" nodeType="withEffect">
-                                  <p:stCondLst>
-                                    <p:cond delay="0"/>
-                                  </p:stCondLst>
-                                  <p:childTnLst>
-                                    <p:set>
-                                      <p:cBhvr>
-                                        <p:cTn id="29" dur="1" fill="hold">
-                                          <p:stCondLst>
-                                            <p:cond delay="0"/>
-                                          </p:stCondLst>
-                                        </p:cTn>
-                                        <p:tgtEl>
-                                          <p:spTgt spid="2">
-                                            <p:txEl>
-                                              <p:pRg st="5" end="5"/>
-                                            </p:txEl>
-                                          </p:spTgt>
-                                        </p:tgtEl>
-                                        <p:attrNameLst>
-                                          <p:attrName>style.visibility</p:attrName>
-                                        </p:attrNameLst>
-                                      </p:cBhvr>
-                                      <p:to>
-                                        <p:strVal val="visible"/>
-                                      </p:to>
-                                    </p:set>
-                                    <p:animEffect transition="in" filter="fade">
-                                      <p:cBhvr>
-                                        <p:cTn id="30" dur="500"/>
-                                        <p:tgtEl>
-                                          <p:spTgt spid="2">
-                                            <p:txEl>
-                                              <p:pRg st="5" end="5"/>
-                                            </p:txEl>
-                                          </p:spTgt>
-                                        </p:tgtEl>
-                                      </p:cBhvr>
-                                    </p:animEffect>
-                                  </p:childTnLst>
-                                </p:cTn>
-                              </p:par>
-                              <p:par>
-                                <p:cTn id="31" presetID="10" presetClass="entr" presetSubtype="0" fill="hold" grpId="0" nodeType="withEffect">
-                                  <p:stCondLst>
-                                    <p:cond delay="0"/>
-                                  </p:stCondLst>
-                                  <p:childTnLst>
-                                    <p:set>
-                                      <p:cBhvr>
-                                        <p:cTn id="32" dur="1" fill="hold">
-                                          <p:stCondLst>
-                                            <p:cond delay="0"/>
-                                          </p:stCondLst>
-                                        </p:cTn>
-                                        <p:tgtEl>
-                                          <p:spTgt spid="2">
-                                            <p:txEl>
-                                              <p:pRg st="7" end="7"/>
-                                            </p:txEl>
-                                          </p:spTgt>
-                                        </p:tgtEl>
-                                        <p:attrNameLst>
-                                          <p:attrName>style.visibility</p:attrName>
-                                        </p:attrNameLst>
-                                      </p:cBhvr>
-                                      <p:to>
-                                        <p:strVal val="visible"/>
-                                      </p:to>
-                                    </p:set>
-                                    <p:animEffect transition="in" filter="fade">
-                                      <p:cBhvr>
-                                        <p:cTn id="33" dur="500"/>
-                                        <p:tgtEl>
-                                          <p:spTgt spid="2">
-                                            <p:txEl>
-                                              <p:pRg st="7" end="7"/>
-                                            </p:txEl>
-                                          </p:spTgt>
-                                        </p:tgtEl>
-                                      </p:cBhvr>
-                                    </p:animEffect>
-                                  </p:childTnLst>
-                                </p:cTn>
-                              </p:par>
-                            </p:childTnLst>
-                          </p:cTn>
-                        </p:par>
-                      </p:childTnLst>
-                    </p:cTn>
-                  </p:par>
-                </p:childTnLst>
-              </p:cTn>
-              <p:prevCondLst>
-                <p:cond evt="onPrev" delay="0">
-                  <p:tgtEl>
-                    <p:sldTgt/>
-                  </p:tgtEl>
-                </p:cond>
-              </p:prevCondLst>
-              <p:nextCondLst>
-                <p:cond evt="onNext" delay="0">
-                  <p:tgtEl>
-                    <p:sldTgt/>
-                  </p:tgtEl>
-                </p:cond>
-              </p:nextCondLst>
-            </p:seq>
-          </p:childTnLst>
-        </p:cTn>
-      </p:par>
-    </p:tnLst>
-    <p:bldLst>
-      <p:bldP spid="2" grpId="0" uiExpand="1" build="p"/>
     </p:bldLst>
   </p:timing>
 </p:sld>

</xml_diff>